<commit_message>
[2023-04-06] RMS 시스템 인수인계
</commit_message>
<xml_diff>
--- a/src/main/webapp/WEB-INF/Files/2023-03/calendar03.pptx
+++ b/src/main/webapp/WEB-INF/Files/2023-03/calendar03.pptx
@@ -1,17 +1,17 @@
 
 <file path=ppt/presentation.xml><?xml version="1.0" encoding="utf-8"?>
-<p:presentation xmlns:r="http://schemas.openxmlformats.org/officeDocument/2006/relationships" xmlns:c="http://schemas.openxmlformats.org/drawingml/2006/chart" xmlns:a="http://schemas.openxmlformats.org/drawingml/2006/main" xmlns:dgm="http://schemas.openxmlformats.org/drawingml/2006/diagram" xmlns:dsp="http://schemas.microsoft.com/office/drawing/2008/diagram" xmlns:p="http://schemas.openxmlformats.org/presentationml/2006/main" showSpecialPlsOnTitleSld="0" strictFirstAndLastChars="0" saveSubsetFonts="1">
+<p:presentation xmlns:a="http://schemas.openxmlformats.org/drawingml/2006/main" xmlns:r="http://schemas.openxmlformats.org/officeDocument/2006/relationships" xmlns:p="http://schemas.openxmlformats.org/presentationml/2006/main" showSpecialPlsOnTitleSld="0" strictFirstAndLastChars="0" saveSubsetFonts="1">
   <p:sldMasterIdLst>
     <p:sldMasterId id="2147521141" r:id="rId1"/>
   </p:sldMasterIdLst>
   <p:notesMasterIdLst>
-    <p:notesMasterId r:id="rId2"/>
+    <p:notesMasterId r:id="rId3"/>
   </p:notesMasterIdLst>
   <p:handoutMasterIdLst>
-    <p:handoutMasterId r:id="rId3"/>
+    <p:handoutMasterId r:id="rId4"/>
   </p:handoutMasterIdLst>
   <p:sldIdLst>
-    <p:sldId id="256" r:id="rId4"/>
+    <p:sldId id="256" r:id="rId2"/>
   </p:sldIdLst>
   <p:sldSz cx="9906000" cy="6858000" type="A4"/>
   <p:notesSz cx="6797675" cy="9926638"/>
@@ -140,17 +140,48 @@
       </a:defRPr>
     </a:lvl9pPr>
   </p:defaultTextStyle>
+  <p:extLst>
+    <p:ext uri="{EFAFB233-063F-42B5-8137-9DF3F51BA10A}">
+      <p15:sldGuideLst xmlns:p15="http://schemas.microsoft.com/office/powerpoint/2012/main">
+        <p15:guide id="1" orient="horz" pos="2447">
+          <p15:clr>
+            <a:srgbClr val="A4A3A4"/>
+          </p15:clr>
+        </p15:guide>
+        <p15:guide id="2" pos="3119">
+          <p15:clr>
+            <a:srgbClr val="A4A3A4"/>
+          </p15:clr>
+        </p15:guide>
+      </p15:sldGuideLst>
+    </p:ext>
+    <p:ext uri="{2D200454-40CA-4A62-9FC3-DE9A4176ACB9}">
+      <p15:notesGuideLst xmlns:p15="http://schemas.microsoft.com/office/powerpoint/2012/main">
+        <p15:guide id="1" orient="horz" pos="3125">
+          <p15:clr>
+            <a:srgbClr val="A4A3A4"/>
+          </p15:clr>
+        </p15:guide>
+        <p15:guide id="2" pos="2139">
+          <p15:clr>
+            <a:srgbClr val="A4A3A4"/>
+          </p15:clr>
+        </p15:guide>
+      </p15:notesGuideLst>
+    </p:ext>
+  </p:extLst>
 </p:presentation>
 </file>
 
 <file path=ppt/handoutMasters/handoutMaster1.xml><?xml version="1.0" encoding="utf-8"?>
-<p:handoutMaster xmlns:r="http://schemas.openxmlformats.org/officeDocument/2006/relationships" xmlns:c="http://schemas.openxmlformats.org/drawingml/2006/chart" xmlns:a="http://schemas.openxmlformats.org/drawingml/2006/main" xmlns:dgm="http://schemas.openxmlformats.org/drawingml/2006/diagram" xmlns:dsp="http://schemas.microsoft.com/office/drawing/2008/diagram" xmlns:p="http://schemas.openxmlformats.org/presentationml/2006/main">
+<p:handoutMaster xmlns:a="http://schemas.openxmlformats.org/drawingml/2006/main" xmlns:r="http://schemas.openxmlformats.org/officeDocument/2006/relationships" xmlns:p="http://schemas.openxmlformats.org/presentationml/2006/main">
   <p:cSld>
     <p:bg>
-      <p:bgPr shadeToTitle="0">
+      <p:bgPr>
         <a:solidFill>
           <a:schemeClr val="bg1"/>
         </a:solidFill>
+        <a:effectLst/>
       </p:bgPr>
     </p:bg>
     <p:spTree>
@@ -174,7 +205,7 @@
             <a:spLocks noGrp="1" noChangeArrowheads="1"/>
           </p:cNvSpPr>
           <p:nvPr>
-            <p:ph type="hdr" sz="quarter" idx="0"/>
+            <p:ph type="hdr" sz="quarter"/>
           </p:nvPr>
         </p:nvSpPr>
         <p:spPr>
@@ -216,10 +247,6 @@
             <a:pPr>
               <a:defRPr/>
             </a:pPr>
-            <a:r>
-              <a:rPr lang="ko-KR" altLang="en-US"/>
-              <a:t/>
-            </a:r>
             <a:endParaRPr lang="ko-KR" altLang="en-US"/>
           </a:p>
         </p:txBody>
@@ -278,7 +305,7 @@
               <a:pPr>
                 <a:defRPr/>
               </a:pPr>
-              <a:t>2023-03-02</a:t>
+              <a:t>2023-03-10</a:t>
             </a:fld>
             <a:endParaRPr lang="en-US" altLang="ko-KR"/>
           </a:p>
@@ -404,13 +431,14 @@
 </file>
 
 <file path=ppt/notesMasters/notesMaster1.xml><?xml version="1.0" encoding="utf-8"?>
-<p:notesMaster xmlns:r="http://schemas.openxmlformats.org/officeDocument/2006/relationships" xmlns:c="http://schemas.openxmlformats.org/drawingml/2006/chart" xmlns:a="http://schemas.openxmlformats.org/drawingml/2006/main" xmlns:dgm="http://schemas.openxmlformats.org/drawingml/2006/diagram" xmlns:dsp="http://schemas.microsoft.com/office/drawing/2008/diagram" xmlns:p="http://schemas.openxmlformats.org/presentationml/2006/main">
+<p:notesMaster xmlns:a="http://schemas.openxmlformats.org/drawingml/2006/main" xmlns:r="http://schemas.openxmlformats.org/officeDocument/2006/relationships" xmlns:p="http://schemas.openxmlformats.org/presentationml/2006/main">
   <p:cSld>
     <p:bg>
-      <p:bgPr shadeToTitle="0">
+      <p:bgPr>
         <a:solidFill>
           <a:schemeClr val="bg1"/>
         </a:solidFill>
+        <a:effectLst/>
       </p:bgPr>
     </p:bg>
     <p:spTree>
@@ -434,7 +462,7 @@
             <a:spLocks noGrp="1" noChangeArrowheads="1"/>
           </p:cNvSpPr>
           <p:nvPr>
-            <p:ph type="hdr" sz="quarter" idx="0"/>
+            <p:ph type="hdr" sz="quarter"/>
           </p:nvPr>
         </p:nvSpPr>
         <p:spPr>
@@ -476,10 +504,6 @@
             <a:pPr>
               <a:defRPr/>
             </a:pPr>
-            <a:r>
-              <a:rPr lang="ko-KR" altLang="en-US"/>
-              <a:t/>
-            </a:r>
             <a:endParaRPr lang="ko-KR" altLang="en-US"/>
           </a:p>
         </p:txBody>
@@ -538,7 +562,7 @@
               <a:pPr>
                 <a:defRPr/>
               </a:pPr>
-              <a:t>2023-03-02</a:t>
+              <a:t>2023-03-10</a:t>
             </a:fld>
             <a:endParaRPr lang="en-US" altLang="ko-KR"/>
           </a:p>
@@ -610,7 +634,6 @@
               <a:rPr lang="en-US" altLang="ko-KR"/>
               <a:t>Click to edit Master text styles</a:t>
             </a:r>
-            <a:endParaRPr lang="en-US" altLang="ko-KR"/>
           </a:p>
           <a:p>
             <a:pPr lvl="1">
@@ -620,7 +643,6 @@
               <a:rPr lang="en-US" altLang="ko-KR"/>
               <a:t>Second level</a:t>
             </a:r>
-            <a:endParaRPr lang="en-US" altLang="ko-KR"/>
           </a:p>
           <a:p>
             <a:pPr lvl="2">
@@ -630,7 +652,6 @@
               <a:rPr lang="en-US" altLang="ko-KR"/>
               <a:t>Third level</a:t>
             </a:r>
-            <a:endParaRPr lang="en-US" altLang="ko-KR"/>
           </a:p>
           <a:p>
             <a:pPr lvl="3">
@@ -640,7 +661,6 @@
               <a:rPr lang="en-US" altLang="ko-KR"/>
               <a:t>Fourth level</a:t>
             </a:r>
-            <a:endParaRPr lang="en-US" altLang="ko-KR"/>
           </a:p>
           <a:p>
             <a:pPr lvl="4">
@@ -650,7 +670,6 @@
               <a:rPr lang="en-US" altLang="ko-KR"/>
               <a:t>Fifth level</a:t>
             </a:r>
-            <a:endParaRPr lang="en-US" altLang="ko-KR"/>
           </a:p>
         </p:txBody>
       </p:sp>
@@ -897,7 +916,7 @@
 </file>
 
 <file path=ppt/notesSlides/notesSlide1.xml><?xml version="1.0" encoding="utf-8"?>
-<p:notes xmlns:r="http://schemas.openxmlformats.org/officeDocument/2006/relationships" xmlns:c="http://schemas.openxmlformats.org/drawingml/2006/chart" xmlns:a="http://schemas.openxmlformats.org/drawingml/2006/main" xmlns:dgm="http://schemas.openxmlformats.org/drawingml/2006/diagram" xmlns:dsp="http://schemas.microsoft.com/office/drawing/2008/diagram" xmlns:p="http://schemas.openxmlformats.org/presentationml/2006/main">
+<p:notes xmlns:a="http://schemas.openxmlformats.org/drawingml/2006/main" xmlns:r="http://schemas.openxmlformats.org/officeDocument/2006/relationships" xmlns:p="http://schemas.openxmlformats.org/presentationml/2006/main">
   <p:cSld>
     <p:spTree>
       <p:nvGrpSpPr>
@@ -920,7 +939,7 @@
             <a:spLocks noGrp="1" noRot="1" noChangeAspect="1" noChangeArrowheads="1" noTextEdit="1"/>
           </p:cNvSpPr>
           <p:nvPr>
-            <p:ph type="sldImg" idx="0"/>
+            <p:ph type="sldImg"/>
           </p:nvPr>
         </p:nvSpPr>
         <p:spPr>
@@ -952,10 +971,6 @@
             <a:pPr eaLnBrk="1" hangingPunct="1">
               <a:defRPr/>
             </a:pPr>
-            <a:r>
-              <a:rPr lang="ko-KR" altLang="en-US"/>
-              <a:t/>
-            </a:r>
             <a:endParaRPr lang="ko-KR" altLang="en-US"/>
           </a:p>
         </p:txBody>
@@ -3560,7 +3575,7 @@
 </file>
 
 <file path=ppt/slides/slide1.xml><?xml version="1.0" encoding="utf-8"?>
-<p:sld xmlns:r="http://schemas.openxmlformats.org/officeDocument/2006/relationships" xmlns:c="http://schemas.openxmlformats.org/drawingml/2006/chart" xmlns:a="http://schemas.openxmlformats.org/drawingml/2006/main" xmlns:dgm="http://schemas.openxmlformats.org/drawingml/2006/diagram" xmlns:dsp="http://schemas.microsoft.com/office/drawing/2008/diagram" xmlns:p="http://schemas.openxmlformats.org/presentationml/2006/main">
+<p:sld xmlns:a="http://schemas.openxmlformats.org/drawingml/2006/main" xmlns:r="http://schemas.openxmlformats.org/officeDocument/2006/relationships" xmlns:p="http://schemas.openxmlformats.org/presentationml/2006/main">
   <p:cSld>
     <p:spTree>
       <p:nvGrpSpPr>
@@ -3713,15 +3728,31 @@
               <a:defRPr/>
             </a:pPr>
             <a:r>
+              <a:rPr kumimoji="1" lang="en-US" altLang="ko-KR" sz="1566" dirty="0">
+                <a:solidFill>
+                  <a:schemeClr val="tx1"/>
+                </a:solidFill>
+              </a:rPr>
+              <a:t>1 . Business Calendar </a:t>
+            </a:r>
+            <a:r>
               <a:rPr kumimoji="1" lang="en-US" altLang="ko-KR" sz="1566">
                 <a:solidFill>
                   <a:schemeClr val="tx1"/>
                 </a:solidFill>
               </a:rPr>
-              <a:t>1 . Business Calendar (02</a:t>
+              <a:t>(</a:t>
             </a:r>
             <a:r>
-              <a:rPr kumimoji="1" lang="ko-KR" altLang="en-US" sz="1566">
+              <a:rPr kumimoji="1" lang="en-US" altLang="ko-KR" sz="1566" smtClean="0">
+                <a:solidFill>
+                  <a:schemeClr val="tx1"/>
+                </a:solidFill>
+              </a:rPr>
+              <a:t>03</a:t>
+            </a:r>
+            <a:r>
+              <a:rPr kumimoji="1" lang="ko-KR" altLang="en-US" sz="1566" smtClean="0">
                 <a:solidFill>
                   <a:schemeClr val="tx1"/>
                 </a:solidFill>
@@ -3729,14 +3760,14 @@
               <a:t>월</a:t>
             </a:r>
             <a:r>
-              <a:rPr kumimoji="1" lang="en-US" altLang="ko-KR" sz="1566">
+              <a:rPr kumimoji="1" lang="en-US" altLang="ko-KR" sz="1566" dirty="0">
                 <a:solidFill>
                   <a:schemeClr val="tx1"/>
                 </a:solidFill>
               </a:rPr>
               <a:t>)</a:t>
             </a:r>
-            <a:endParaRPr kumimoji="1" lang="ko-KR" altLang="en-US" sz="1566">
+            <a:endParaRPr kumimoji="1" lang="ko-KR" altLang="en-US" sz="1566" dirty="0">
               <a:solidFill>
                 <a:schemeClr val="tx1"/>
               </a:solidFill>
@@ -3754,24 +3785,67 @@
         </p:nvGraphicFramePr>
         <p:xfrm>
           <a:off x="373635" y="1192132"/>
-          <a:ext cx="9121451" cy="5001176"/>
+          <a:ext cx="9121451" cy="5001716"/>
         </p:xfrm>
         <a:graphic>
           <a:graphicData uri="http://schemas.openxmlformats.org/drawingml/2006/table">
             <a:tbl>
+              <a:tblPr/>
               <a:tblGrid>
-                <a:gridCol w="1292413"/>
-                <a:gridCol w="1292413"/>
-                <a:gridCol w="1292413"/>
-                <a:gridCol w="1298626"/>
-                <a:gridCol w="1335907"/>
-                <a:gridCol w="1342121"/>
-                <a:gridCol w="1267558"/>
+                <a:gridCol w="1292413">
+                  <a:extLst>
+                    <a:ext uri="{9D8B030D-6E8A-4147-A177-3AD203B41FA5}">
+                      <a16:colId xmlns:a16="http://schemas.microsoft.com/office/drawing/2014/main" val="20000"/>
+                    </a:ext>
+                  </a:extLst>
+                </a:gridCol>
+                <a:gridCol w="1292413">
+                  <a:extLst>
+                    <a:ext uri="{9D8B030D-6E8A-4147-A177-3AD203B41FA5}">
+                      <a16:colId xmlns:a16="http://schemas.microsoft.com/office/drawing/2014/main" val="20001"/>
+                    </a:ext>
+                  </a:extLst>
+                </a:gridCol>
+                <a:gridCol w="1292413">
+                  <a:extLst>
+                    <a:ext uri="{9D8B030D-6E8A-4147-A177-3AD203B41FA5}">
+                      <a16:colId xmlns:a16="http://schemas.microsoft.com/office/drawing/2014/main" val="20002"/>
+                    </a:ext>
+                  </a:extLst>
+                </a:gridCol>
+                <a:gridCol w="1298626">
+                  <a:extLst>
+                    <a:ext uri="{9D8B030D-6E8A-4147-A177-3AD203B41FA5}">
+                      <a16:colId xmlns:a16="http://schemas.microsoft.com/office/drawing/2014/main" val="20003"/>
+                    </a:ext>
+                  </a:extLst>
+                </a:gridCol>
+                <a:gridCol w="1335907">
+                  <a:extLst>
+                    <a:ext uri="{9D8B030D-6E8A-4147-A177-3AD203B41FA5}">
+                      <a16:colId xmlns:a16="http://schemas.microsoft.com/office/drawing/2014/main" val="20004"/>
+                    </a:ext>
+                  </a:extLst>
+                </a:gridCol>
+                <a:gridCol w="1342121">
+                  <a:extLst>
+                    <a:ext uri="{9D8B030D-6E8A-4147-A177-3AD203B41FA5}">
+                      <a16:colId xmlns:a16="http://schemas.microsoft.com/office/drawing/2014/main" val="20005"/>
+                    </a:ext>
+                  </a:extLst>
+                </a:gridCol>
+                <a:gridCol w="1267558">
+                  <a:extLst>
+                    <a:ext uri="{9D8B030D-6E8A-4147-A177-3AD203B41FA5}">
+                      <a16:colId xmlns:a16="http://schemas.microsoft.com/office/drawing/2014/main" val="20006"/>
+                    </a:ext>
+                  </a:extLst>
+                </a:gridCol>
               </a:tblGrid>
               <a:tr h="226092">
                 <a:tc>
                   <a:txBody>
-                    <a:bodyPr vert="horz" lIns="89475" tIns="44735" rIns="89475" bIns="44735" anchor="ctr" anchorCtr="0"/>
+                    <a:bodyPr/>
                     <a:lstStyle>
                       <a:lvl1pPr>
                         <a:defRPr kumimoji="1" sz="1200">
@@ -3919,7 +3993,7 @@
                       <a:r>
                         <a:rPr kumimoji="0" lang="ko-KR" altLang="en-US" sz="900" b="0" i="0" u="none" strike="noStrike" cap="none" normalizeH="0" baseline="0">
                           <a:solidFill>
-                            <a:srgbClr val="ff0000"/>
+                            <a:srgbClr val="FF0000"/>
                           </a:solidFill>
                           <a:effectLst/>
                           <a:latin typeface="맑은 고딕"/>
@@ -3975,13 +4049,13 @@
                       <a:noFill/>
                     </a:lnBlToTr>
                     <a:solidFill>
-                      <a:srgbClr val="eaeaea"/>
+                      <a:srgbClr val="EAEAEA"/>
                     </a:solidFill>
                   </a:tcPr>
                 </a:tc>
                 <a:tc>
                   <a:txBody>
-                    <a:bodyPr vert="horz" lIns="89475" tIns="44735" rIns="89475" bIns="44735" anchor="ctr" anchorCtr="0"/>
+                    <a:bodyPr/>
                     <a:lstStyle>
                       <a:lvl1pPr>
                         <a:defRPr kumimoji="1" sz="1200">
@@ -4184,13 +4258,13 @@
                       <a:noFill/>
                     </a:lnBlToTr>
                     <a:solidFill>
-                      <a:srgbClr val="eaeaea"/>
+                      <a:srgbClr val="EAEAEA"/>
                     </a:solidFill>
                   </a:tcPr>
                 </a:tc>
                 <a:tc>
                   <a:txBody>
-                    <a:bodyPr vert="horz" lIns="89475" tIns="44735" rIns="89475" bIns="44735" anchor="ctr" anchorCtr="0"/>
+                    <a:bodyPr/>
                     <a:lstStyle>
                       <a:lvl1pPr>
                         <a:defRPr kumimoji="1" sz="1200">
@@ -4393,13 +4467,13 @@
                       <a:noFill/>
                     </a:lnBlToTr>
                     <a:solidFill>
-                      <a:srgbClr val="eaeaea"/>
+                      <a:srgbClr val="EAEAEA"/>
                     </a:solidFill>
                   </a:tcPr>
                 </a:tc>
                 <a:tc>
                   <a:txBody>
-                    <a:bodyPr vert="horz" lIns="89475" tIns="44735" rIns="89475" bIns="44735" anchor="ctr" anchorCtr="0"/>
+                    <a:bodyPr/>
                     <a:lstStyle>
                       <a:lvl1pPr>
                         <a:defRPr kumimoji="1" sz="1200">
@@ -4602,13 +4676,13 @@
                       <a:noFill/>
                     </a:lnBlToTr>
                     <a:solidFill>
-                      <a:srgbClr val="eaeaea"/>
+                      <a:srgbClr val="EAEAEA"/>
                     </a:solidFill>
                   </a:tcPr>
                 </a:tc>
                 <a:tc>
                   <a:txBody>
-                    <a:bodyPr vert="horz" lIns="89475" tIns="44735" rIns="89475" bIns="44735" anchor="ctr" anchorCtr="0"/>
+                    <a:bodyPr/>
                     <a:lstStyle>
                       <a:lvl1pPr>
                         <a:defRPr kumimoji="1" sz="1200">
@@ -4811,13 +4885,13 @@
                       <a:noFill/>
                     </a:lnBlToTr>
                     <a:solidFill>
-                      <a:srgbClr val="eaeaea"/>
+                      <a:srgbClr val="EAEAEA"/>
                     </a:solidFill>
                   </a:tcPr>
                 </a:tc>
                 <a:tc>
                   <a:txBody>
-                    <a:bodyPr vert="horz" lIns="89475" tIns="44735" rIns="89475" bIns="44735" anchor="ctr" anchorCtr="0"/>
+                    <a:bodyPr/>
                     <a:lstStyle>
                       <a:lvl1pPr>
                         <a:defRPr kumimoji="1" sz="1200">
@@ -5020,13 +5094,13 @@
                       <a:noFill/>
                     </a:lnBlToTr>
                     <a:solidFill>
-                      <a:srgbClr val="eaeaea"/>
+                      <a:srgbClr val="EAEAEA"/>
                     </a:solidFill>
                   </a:tcPr>
                 </a:tc>
                 <a:tc>
                   <a:txBody>
-                    <a:bodyPr vert="horz" lIns="89475" tIns="44735" rIns="89475" bIns="44735" anchor="ctr" anchorCtr="0"/>
+                    <a:bodyPr/>
                     <a:lstStyle>
                       <a:lvl1pPr>
                         <a:defRPr kumimoji="1" sz="1200">
@@ -5174,7 +5248,7 @@
                       <a:r>
                         <a:rPr kumimoji="0" lang="ko-KR" altLang="en-US" sz="900" b="0" i="0" u="none" strike="noStrike" cap="none" normalizeH="0" baseline="0">
                           <a:solidFill>
-                            <a:srgbClr val="0000ff"/>
+                            <a:srgbClr val="0000FF"/>
                           </a:solidFill>
                           <a:effectLst/>
                           <a:latin typeface="맑은 고딕"/>
@@ -5230,15 +5304,20 @@
                       <a:noFill/>
                     </a:lnBlToTr>
                     <a:solidFill>
-                      <a:srgbClr val="eaeaea"/>
+                      <a:srgbClr val="EAEAEA"/>
                     </a:solidFill>
                   </a:tcPr>
                 </a:tc>
+                <a:extLst>
+                  <a:ext uri="{0D108BD9-81ED-4DB2-BD59-A6C34878D82A}">
+                    <a16:rowId xmlns:a16="http://schemas.microsoft.com/office/drawing/2014/main" val="10000"/>
+                  </a:ext>
+                </a:extLst>
               </a:tr>
               <a:tr h="950733">
                 <a:tc>
                   <a:txBody>
-                    <a:bodyPr vert="horz" lIns="89475" tIns="44735" rIns="89475" bIns="44735" anchor="t" anchorCtr="0"/>
+                    <a:bodyPr/>
                     <a:lstStyle>
                       <a:lvl1pPr>
                         <a:defRPr kumimoji="1" sz="1200">
@@ -5385,7 +5464,7 @@
                       </a:pPr>
                       <a:endParaRPr kumimoji="0" lang="en-US" altLang="ko-KR" sz="900" b="0" i="0" u="none" strike="noStrike" cap="none" normalizeH="0" baseline="0">
                         <a:solidFill>
-                          <a:srgbClr val="ff0000"/>
+                          <a:srgbClr val="FF0000"/>
                         </a:solidFill>
                         <a:effectLst/>
                         <a:latin typeface="맑은 고딕"/>
@@ -5434,7 +5513,7 @@
                 </a:tc>
                 <a:tc>
                   <a:txBody>
-                    <a:bodyPr vert="horz" lIns="89475" tIns="44735" rIns="89475" bIns="44735" anchor="t" anchorCtr="0"/>
+                    <a:bodyPr/>
                     <a:lstStyle>
                       <a:lvl1pPr>
                         <a:defRPr kumimoji="1" sz="1200">
@@ -5630,7 +5709,7 @@
                 </a:tc>
                 <a:tc>
                   <a:txBody>
-                    <a:bodyPr vert="horz" lIns="89475" tIns="44735" rIns="89475" bIns="44735" anchor="t" anchorCtr="0"/>
+                    <a:bodyPr/>
                     <a:lstStyle>
                       <a:lvl1pPr>
                         <a:defRPr kumimoji="1" sz="1200">
@@ -5826,7 +5905,7 @@
                 </a:tc>
                 <a:tc>
                   <a:txBody>
-                    <a:bodyPr vert="horz" lIns="89475" tIns="44735" rIns="89475" bIns="44735" anchor="t" anchorCtr="0"/>
+                    <a:bodyPr/>
                     <a:lstStyle>
                       <a:lvl1pPr defTabSz="957263">
                         <a:defRPr kumimoji="1" sz="1200">
@@ -5974,7 +6053,7 @@
                       <a:r>
                         <a:rPr kumimoji="0" lang="en-US" altLang="ko-KR" sz="900" b="0" i="0" u="none" strike="noStrike" cap="none" normalizeH="0" baseline="0">
                           <a:solidFill>
-                            <a:srgbClr val="ff0000"/>
+                            <a:srgbClr val="FF0000"/>
                           </a:solidFill>
                           <a:effectLst/>
                           <a:latin typeface="맑은 고딕"/>
@@ -5983,9 +6062,26 @@
                         </a:rPr>
                         <a:t>1</a:t>
                       </a:r>
+                    </a:p>
+                    <a:p>
+                      <a:pPr marL="0" marR="0" lvl="0" indent="0" algn="l" defTabSz="957263" rtl="0" eaLnBrk="1" latinLnBrk="0" hangingPunct="1">
+                        <a:lnSpc>
+                          <a:spcPct val="100000"/>
+                        </a:lnSpc>
+                        <a:spcBef>
+                          <a:spcPct val="0"/>
+                        </a:spcBef>
+                        <a:spcAft>
+                          <a:spcPct val="0"/>
+                        </a:spcAft>
+                        <a:buClrTx/>
+                        <a:buFontTx/>
+                        <a:buNone/>
+                        <a:defRPr/>
+                      </a:pPr>
                       <a:endParaRPr kumimoji="0" lang="en-US" altLang="ko-KR" sz="900" b="0" i="0" u="none" strike="noStrike" cap="none" normalizeH="0" baseline="0">
                         <a:solidFill>
-                          <a:srgbClr val="ff0000"/>
+                          <a:srgbClr val="FF0000"/>
                         </a:solidFill>
                         <a:effectLst/>
                         <a:latin typeface="맑은 고딕"/>
@@ -6009,36 +6105,10 @@
                         <a:buNone/>
                         <a:defRPr/>
                       </a:pPr>
-                      <a:endParaRPr kumimoji="0" lang="en-US" altLang="ko-KR" sz="900" b="0" i="0" u="none" strike="noStrike" cap="none" normalizeH="0" baseline="0">
-                        <a:solidFill>
-                          <a:srgbClr val="ff0000"/>
-                        </a:solidFill>
-                        <a:effectLst/>
-                        <a:latin typeface="맑은 고딕"/>
-                        <a:ea typeface="맑은 고딕"/>
-                        <a:cs typeface="+mn-cs"/>
-                      </a:endParaRPr>
-                    </a:p>
-                    <a:p>
-                      <a:pPr marL="0" marR="0" lvl="0" indent="0" algn="l" defTabSz="957263" rtl="0" eaLnBrk="1" latinLnBrk="0" hangingPunct="1">
-                        <a:lnSpc>
-                          <a:spcPct val="100000"/>
-                        </a:lnSpc>
-                        <a:spcBef>
-                          <a:spcPct val="0"/>
-                        </a:spcBef>
-                        <a:spcAft>
-                          <a:spcPct val="0"/>
-                        </a:spcAft>
-                        <a:buClrTx/>
-                        <a:buFontTx/>
-                        <a:buNone/>
-                        <a:defRPr/>
-                      </a:pPr>
                       <a:r>
                         <a:rPr kumimoji="0" lang="ko-KR" altLang="en-US" sz="900" b="0" i="0" u="none" strike="noStrike" cap="none" normalizeH="0" baseline="0">
                           <a:solidFill>
-                            <a:srgbClr val="ff0000"/>
+                            <a:srgbClr val="FF0000"/>
                           </a:solidFill>
                           <a:effectLst/>
                           <a:latin typeface="맑은 고딕"/>
@@ -6047,15 +6117,6 @@
                         </a:rPr>
                         <a:t>삼일절 </a:t>
                       </a:r>
-                      <a:endParaRPr kumimoji="0" lang="ko-KR" altLang="en-US" sz="900" b="0" i="0" u="none" strike="noStrike" cap="none" normalizeH="0" baseline="0">
-                        <a:solidFill>
-                          <a:srgbClr val="ff0000"/>
-                        </a:solidFill>
-                        <a:effectLst/>
-                        <a:latin typeface="맑은 고딕"/>
-                        <a:ea typeface="맑은 고딕"/>
-                        <a:cs typeface="+mn-cs"/>
-                      </a:endParaRPr>
                     </a:p>
                   </a:txBody>
                   <a:tcPr marL="89475" marR="89475" marT="44736" marB="44736" horzOverflow="overflow">
@@ -6098,7 +6159,7 @@
                 </a:tc>
                 <a:tc>
                   <a:txBody>
-                    <a:bodyPr vert="horz" lIns="89475" tIns="44735" rIns="89475" bIns="44735" anchor="t" anchorCtr="0"/>
+                    <a:bodyPr/>
                     <a:lstStyle>
                       <a:lvl1pPr defTabSz="957263">
                         <a:defRPr kumimoji="1" sz="1200">
@@ -6255,15 +6316,6 @@
                         </a:rPr>
                         <a:t>2</a:t>
                       </a:r>
-                      <a:endParaRPr kumimoji="0" lang="en-US" altLang="ko-KR" sz="900" b="0" i="0" u="none" strike="noStrike" cap="none" normalizeH="0" baseline="0">
-                        <a:solidFill>
-                          <a:schemeClr val="tx1"/>
-                        </a:solidFill>
-                        <a:effectLst/>
-                        <a:latin typeface="맑은 고딕"/>
-                        <a:ea typeface="맑은 고딕"/>
-                        <a:cs typeface="+mn-cs"/>
-                      </a:endParaRPr>
                     </a:p>
                   </a:txBody>
                   <a:tcPr marL="89475" marR="89475" marT="44736" marB="44736" horzOverflow="overflow">
@@ -6306,7 +6358,7 @@
                 </a:tc>
                 <a:tc>
                   <a:txBody>
-                    <a:bodyPr vert="horz" lIns="89475" tIns="44732" rIns="89475" bIns="44732" anchor="t" anchorCtr="0"/>
+                    <a:bodyPr/>
                     <a:lstStyle>
                       <a:lvl1pPr defTabSz="957263">
                         <a:defRPr kumimoji="1" sz="1200">
@@ -6463,15 +6515,6 @@
                         </a:rPr>
                         <a:t>3</a:t>
                       </a:r>
-                      <a:endParaRPr kumimoji="0" lang="en-US" altLang="ko-KR" sz="900" b="0" i="0" u="none" strike="noStrike" cap="none" normalizeH="0" baseline="0">
-                        <a:solidFill>
-                          <a:schemeClr val="tx1"/>
-                        </a:solidFill>
-                        <a:effectLst/>
-                        <a:latin typeface="맑은 고딕"/>
-                        <a:ea typeface="맑은 고딕"/>
-                        <a:cs typeface="+mn-cs"/>
-                      </a:endParaRPr>
                     </a:p>
                   </a:txBody>
                   <a:tcPr marL="89475" marR="89475" marT="44732" marB="44732" horzOverflow="overflow">
@@ -6514,7 +6557,7 @@
                 </a:tc>
                 <a:tc>
                   <a:txBody>
-                    <a:bodyPr vert="horz" lIns="89475" tIns="44735" rIns="89475" bIns="44735" anchor="t" anchorCtr="0"/>
+                    <a:bodyPr/>
                     <a:lstStyle>
                       <a:lvl1pPr>
                         <a:defRPr kumimoji="1" sz="1200">
@@ -6662,7 +6705,7 @@
                       <a:r>
                         <a:rPr kumimoji="0" lang="en-US" altLang="ko-KR" sz="900" b="0" i="0" u="none" strike="noStrike" cap="none" normalizeH="0" baseline="0">
                           <a:solidFill>
-                            <a:srgbClr val="0000cc"/>
+                            <a:srgbClr val="0000CC"/>
                           </a:solidFill>
                           <a:effectLst/>
                           <a:latin typeface="맑은 고딕"/>
@@ -6671,15 +6714,6 @@
                         </a:rPr>
                         <a:t>4</a:t>
                       </a:r>
-                      <a:endParaRPr kumimoji="0" lang="en-US" altLang="ko-KR" sz="900" b="0" i="0" u="none" strike="noStrike" cap="none" normalizeH="0" baseline="0">
-                        <a:solidFill>
-                          <a:srgbClr val="0000cc"/>
-                        </a:solidFill>
-                        <a:effectLst/>
-                        <a:latin typeface="맑은 고딕"/>
-                        <a:ea typeface="맑은 고딕"/>
-                        <a:cs typeface="+mn-cs"/>
-                      </a:endParaRPr>
                     </a:p>
                   </a:txBody>
                   <a:tcPr marL="89475" marR="89475" marT="44736" marB="44736" horzOverflow="overflow">
@@ -6720,11 +6754,16 @@
                     <a:noFill/>
                   </a:tcPr>
                 </a:tc>
+                <a:extLst>
+                  <a:ext uri="{0D108BD9-81ED-4DB2-BD59-A6C34878D82A}">
+                    <a16:rowId xmlns:a16="http://schemas.microsoft.com/office/drawing/2014/main" val="10001"/>
+                  </a:ext>
+                </a:extLst>
               </a:tr>
               <a:tr h="928984">
                 <a:tc>
                   <a:txBody>
-                    <a:bodyPr vert="horz" lIns="89475" tIns="44735" rIns="89475" bIns="44735" anchor="t" anchorCtr="0"/>
+                    <a:bodyPr/>
                     <a:lstStyle>
                       <a:lvl1pPr>
                         <a:defRPr kumimoji="1" sz="1200">
@@ -6872,7 +6911,7 @@
                       <a:r>
                         <a:rPr kumimoji="0" lang="en-US" altLang="ko-KR" sz="900" b="0" i="0" u="none" strike="noStrike" cap="none" normalizeH="0" baseline="0">
                           <a:solidFill>
-                            <a:srgbClr val="ff0000"/>
+                            <a:srgbClr val="FF0000"/>
                           </a:solidFill>
                           <a:effectLst/>
                           <a:latin typeface="맑은 고딕"/>
@@ -6881,15 +6920,6 @@
                         </a:rPr>
                         <a:t>5</a:t>
                       </a:r>
-                      <a:endParaRPr kumimoji="0" lang="en-US" altLang="ko-KR" sz="900" b="0" i="0" u="none" strike="noStrike" cap="none" normalizeH="0" baseline="0">
-                        <a:solidFill>
-                          <a:srgbClr val="ff0000"/>
-                        </a:solidFill>
-                        <a:effectLst/>
-                        <a:latin typeface="맑은 고딕"/>
-                        <a:ea typeface="맑은 고딕"/>
-                        <a:cs typeface="+mn-cs"/>
-                      </a:endParaRPr>
                     </a:p>
                   </a:txBody>
                   <a:tcPr marL="89475" marR="89475" marT="44736" marB="44736" horzOverflow="overflow">
@@ -6932,7 +6962,7 @@
                 </a:tc>
                 <a:tc>
                   <a:txBody>
-                    <a:bodyPr vert="horz" lIns="89475" tIns="44735" rIns="89475" bIns="44735" anchor="t" anchorCtr="0"/>
+                    <a:bodyPr/>
                     <a:lstStyle>
                       <a:lvl1pPr defTabSz="957263">
                         <a:defRPr kumimoji="1" sz="1200">
@@ -7090,15 +7120,6 @@
                         </a:rPr>
                         <a:t>6</a:t>
                       </a:r>
-                      <a:endParaRPr kumimoji="0" lang="en-US" altLang="ko-KR" sz="900" b="0" i="0" u="none" strike="noStrike" cap="none" normalizeH="0" baseline="0">
-                        <a:solidFill>
-                          <a:schemeClr val="tx1"/>
-                        </a:solidFill>
-                        <a:effectLst/>
-                        <a:latin typeface="맑은 고딕"/>
-                        <a:ea typeface="맑은 고딕"/>
-                        <a:cs typeface="+mn-cs"/>
-                      </a:endParaRPr>
                     </a:p>
                   </a:txBody>
                   <a:tcPr marL="89475" marR="89475" marT="44736" marB="44736" horzOverflow="overflow">
@@ -7141,7 +7162,7 @@
                 </a:tc>
                 <a:tc>
                   <a:txBody>
-                    <a:bodyPr vert="horz" lIns="89475" tIns="44735" rIns="89475" bIns="44735" anchor="t" anchorCtr="0"/>
+                    <a:bodyPr/>
                     <a:lstStyle>
                       <a:lvl1pPr defTabSz="957263">
                         <a:defRPr kumimoji="1" sz="1200">
@@ -7298,15 +7319,6 @@
                         </a:rPr>
                         <a:t>7</a:t>
                       </a:r>
-                      <a:endParaRPr kumimoji="0" lang="en-US" altLang="ko-KR" sz="900" b="0" i="0" u="none" strike="noStrike" cap="none" normalizeH="0" baseline="0">
-                        <a:solidFill>
-                          <a:schemeClr val="tx1"/>
-                        </a:solidFill>
-                        <a:effectLst/>
-                        <a:latin typeface="맑은 고딕"/>
-                        <a:ea typeface="맑은 고딕"/>
-                        <a:cs typeface="+mn-cs"/>
-                      </a:endParaRPr>
                     </a:p>
                   </a:txBody>
                   <a:tcPr marL="89475" marR="89475" marT="44736" marB="44736" horzOverflow="overflow">
@@ -7349,7 +7361,7 @@
                 </a:tc>
                 <a:tc>
                   <a:txBody>
-                    <a:bodyPr vert="horz" lIns="89475" tIns="44735" rIns="89475" bIns="44735" anchor="t" anchorCtr="0"/>
+                    <a:bodyPr/>
                     <a:lstStyle>
                       <a:lvl1pPr defTabSz="957263">
                         <a:defRPr kumimoji="1" sz="1200">
@@ -7506,15 +7518,6 @@
                         </a:rPr>
                         <a:t>8</a:t>
                       </a:r>
-                      <a:endParaRPr kumimoji="0" lang="en-US" altLang="ko-KR" sz="900" b="0" i="0" u="none" strike="noStrike" cap="none" normalizeH="0" baseline="0">
-                        <a:solidFill>
-                          <a:schemeClr val="tx1"/>
-                        </a:solidFill>
-                        <a:effectLst/>
-                        <a:latin typeface="맑은 고딕"/>
-                        <a:ea typeface="맑은 고딕"/>
-                        <a:cs typeface="+mn-cs"/>
-                      </a:endParaRPr>
                     </a:p>
                   </a:txBody>
                   <a:tcPr marL="89475" marR="89475" marT="44736" marB="44736" horzOverflow="overflow">
@@ -7557,7 +7560,7 @@
                 </a:tc>
                 <a:tc>
                   <a:txBody>
-                    <a:bodyPr vert="horz" lIns="89475" tIns="44735" rIns="89475" bIns="44735" anchor="t" anchorCtr="0"/>
+                    <a:bodyPr/>
                     <a:lstStyle>
                       <a:lvl1pPr defTabSz="957263">
                         <a:defRPr kumimoji="1" sz="1200">
@@ -7714,15 +7717,6 @@
                         </a:rPr>
                         <a:t>9</a:t>
                       </a:r>
-                      <a:endParaRPr kumimoji="0" lang="en-US" altLang="ko-KR" sz="900" b="0" i="0" u="none" strike="noStrike" cap="none" normalizeH="0" baseline="0">
-                        <a:solidFill>
-                          <a:schemeClr val="tx1"/>
-                        </a:solidFill>
-                        <a:effectLst/>
-                        <a:latin typeface="맑은 고딕"/>
-                        <a:ea typeface="맑은 고딕"/>
-                        <a:cs typeface="+mn-cs"/>
-                      </a:endParaRPr>
                     </a:p>
                   </a:txBody>
                   <a:tcPr marL="89475" marR="89475" marT="44736" marB="44736" horzOverflow="overflow">
@@ -7765,7 +7759,7 @@
                 </a:tc>
                 <a:tc>
                   <a:txBody>
-                    <a:bodyPr vert="horz" lIns="89475" tIns="44735" rIns="89475" bIns="44735" anchor="t" anchorCtr="0"/>
+                    <a:bodyPr/>
                     <a:lstStyle>
                       <a:lvl1pPr defTabSz="957263">
                         <a:defRPr kumimoji="1" sz="1200">
@@ -7922,15 +7916,6 @@
                         </a:rPr>
                         <a:t>10</a:t>
                       </a:r>
-                      <a:endParaRPr kumimoji="0" lang="en-US" altLang="ko-KR" sz="900" b="0" i="0" u="none" strike="noStrike" cap="none" normalizeH="0" baseline="0">
-                        <a:solidFill>
-                          <a:schemeClr val="tx1"/>
-                        </a:solidFill>
-                        <a:effectLst/>
-                        <a:latin typeface="맑은 고딕"/>
-                        <a:ea typeface="맑은 고딕"/>
-                        <a:cs typeface="+mn-cs"/>
-                      </a:endParaRPr>
                     </a:p>
                   </a:txBody>
                   <a:tcPr marL="89475" marR="89475" marT="44736" marB="44736" horzOverflow="overflow">
@@ -7973,7 +7958,7 @@
                 </a:tc>
                 <a:tc>
                   <a:txBody>
-                    <a:bodyPr vert="horz" lIns="89475" tIns="44735" rIns="89475" bIns="44735" anchor="t" anchorCtr="0"/>
+                    <a:bodyPr/>
                     <a:lstStyle>
                       <a:lvl1pPr>
                         <a:defRPr kumimoji="1" sz="1200">
@@ -8121,7 +8106,7 @@
                       <a:r>
                         <a:rPr kumimoji="0" lang="en-US" altLang="ko-KR" sz="900" b="0" i="0" u="none" strike="noStrike" cap="none" normalizeH="0" baseline="0">
                           <a:solidFill>
-                            <a:srgbClr val="0000cc"/>
+                            <a:srgbClr val="0000CC"/>
                           </a:solidFill>
                           <a:effectLst/>
                           <a:latin typeface="맑은 고딕"/>
@@ -8130,15 +8115,6 @@
                         </a:rPr>
                         <a:t>11</a:t>
                       </a:r>
-                      <a:endParaRPr kumimoji="0" lang="en-US" altLang="ko-KR" sz="900" b="0" i="0" u="none" strike="noStrike" cap="none" normalizeH="0" baseline="0">
-                        <a:solidFill>
-                          <a:srgbClr val="0000cc"/>
-                        </a:solidFill>
-                        <a:effectLst/>
-                        <a:latin typeface="맑은 고딕"/>
-                        <a:ea typeface="맑은 고딕"/>
-                        <a:cs typeface="+mn-cs"/>
-                      </a:endParaRPr>
                     </a:p>
                   </a:txBody>
                   <a:tcPr marL="89475" marR="89475" marT="44736" marB="44736" horzOverflow="overflow">
@@ -8179,11 +8155,16 @@
                     <a:noFill/>
                   </a:tcPr>
                 </a:tc>
+                <a:extLst>
+                  <a:ext uri="{0D108BD9-81ED-4DB2-BD59-A6C34878D82A}">
+                    <a16:rowId xmlns:a16="http://schemas.microsoft.com/office/drawing/2014/main" val="10002"/>
+                  </a:ext>
+                </a:extLst>
               </a:tr>
               <a:tr h="1029019">
                 <a:tc>
                   <a:txBody>
-                    <a:bodyPr vert="horz" lIns="89475" tIns="44720" rIns="89475" bIns="44720" anchor="t" anchorCtr="0"/>
+                    <a:bodyPr/>
                     <a:lstStyle>
                       <a:lvl1pPr>
                         <a:defRPr kumimoji="1" sz="1200">
@@ -8331,7 +8312,7 @@
                       <a:r>
                         <a:rPr kumimoji="0" lang="en-US" altLang="ko-KR" sz="900" b="0" i="0" u="none" strike="noStrike" cap="none" normalizeH="0" baseline="0">
                           <a:solidFill>
-                            <a:srgbClr val="ff0000"/>
+                            <a:srgbClr val="FF0000"/>
                           </a:solidFill>
                           <a:effectLst/>
                           <a:latin typeface="맑은 고딕"/>
@@ -8340,15 +8321,6 @@
                         </a:rPr>
                         <a:t>12</a:t>
                       </a:r>
-                      <a:endParaRPr kumimoji="0" lang="en-US" altLang="ko-KR" sz="900" b="0" i="0" u="none" strike="noStrike" cap="none" normalizeH="0" baseline="0">
-                        <a:solidFill>
-                          <a:srgbClr val="ff0000"/>
-                        </a:solidFill>
-                        <a:effectLst/>
-                        <a:latin typeface="맑은 고딕"/>
-                        <a:ea typeface="맑은 고딕"/>
-                        <a:cs typeface="+mn-cs"/>
-                      </a:endParaRPr>
                     </a:p>
                   </a:txBody>
                   <a:tcPr marL="89475" marR="89475" marT="44720" marB="44720" horzOverflow="overflow">
@@ -8391,7 +8363,7 @@
                 </a:tc>
                 <a:tc>
                   <a:txBody>
-                    <a:bodyPr vert="horz" lIns="89475" tIns="44720" rIns="89475" bIns="44720" anchor="t" anchorCtr="0"/>
+                    <a:bodyPr/>
                     <a:lstStyle>
                       <a:lvl1pPr defTabSz="957263">
                         <a:defRPr kumimoji="1" sz="1200">
@@ -8548,15 +8520,6 @@
                         </a:rPr>
                         <a:t>13</a:t>
                       </a:r>
-                      <a:endParaRPr kumimoji="0" lang="en-US" altLang="ko-KR" sz="900" b="0" i="0" u="none" strike="noStrike" cap="none" normalizeH="0" baseline="0">
-                        <a:solidFill>
-                          <a:schemeClr val="tx1"/>
-                        </a:solidFill>
-                        <a:effectLst/>
-                        <a:latin typeface="맑은 고딕"/>
-                        <a:ea typeface="맑은 고딕"/>
-                        <a:cs typeface="+mn-cs"/>
-                      </a:endParaRPr>
                     </a:p>
                   </a:txBody>
                   <a:tcPr marL="89475" marR="89475" marT="44720" marB="44720" horzOverflow="overflow">
@@ -8599,7 +8562,7 @@
                 </a:tc>
                 <a:tc>
                   <a:txBody>
-                    <a:bodyPr vert="horz" lIns="89475" tIns="44720" rIns="89475" bIns="44720" anchor="t" anchorCtr="0"/>
+                    <a:bodyPr/>
                     <a:lstStyle>
                       <a:lvl1pPr defTabSz="957263">
                         <a:defRPr kumimoji="1" sz="1200">
@@ -8756,15 +8719,6 @@
                         </a:rPr>
                         <a:t>14</a:t>
                       </a:r>
-                      <a:endParaRPr kumimoji="0" lang="en-US" altLang="ko-KR" sz="900" b="0" i="0" u="none" strike="noStrike" cap="none" normalizeH="0" baseline="0">
-                        <a:solidFill>
-                          <a:schemeClr val="tx1"/>
-                        </a:solidFill>
-                        <a:effectLst/>
-                        <a:latin typeface="맑은 고딕"/>
-                        <a:ea typeface="맑은 고딕"/>
-                        <a:cs typeface="+mn-cs"/>
-                      </a:endParaRPr>
                     </a:p>
                   </a:txBody>
                   <a:tcPr marL="89475" marR="89475" marT="44720" marB="44720" horzOverflow="overflow">
@@ -8807,7 +8761,7 @@
                 </a:tc>
                 <a:tc>
                   <a:txBody>
-                    <a:bodyPr vert="horz" lIns="89475" tIns="44735" rIns="89475" bIns="44735" anchor="t" anchorCtr="0"/>
+                    <a:bodyPr/>
                     <a:lstStyle>
                       <a:lvl1pPr defTabSz="957263">
                         <a:defRPr kumimoji="1" sz="1200">
@@ -8964,15 +8918,6 @@
                         </a:rPr>
                         <a:t>15</a:t>
                       </a:r>
-                      <a:endParaRPr kumimoji="0" lang="en-US" altLang="ko-KR" sz="900" b="0" i="0" u="none" strike="noStrike" cap="none" normalizeH="0" baseline="0">
-                        <a:solidFill>
-                          <a:schemeClr val="tx1"/>
-                        </a:solidFill>
-                        <a:effectLst/>
-                        <a:latin typeface="맑은 고딕"/>
-                        <a:ea typeface="맑은 고딕"/>
-                        <a:cs typeface="+mn-cs"/>
-                      </a:endParaRPr>
                     </a:p>
                   </a:txBody>
                   <a:tcPr marL="89475" marR="89475" marT="44736" marB="44736" horzOverflow="overflow">
@@ -9015,7 +8960,7 @@
                 </a:tc>
                 <a:tc>
                   <a:txBody>
-                    <a:bodyPr vert="horz" lIns="89475" tIns="44735" rIns="89475" bIns="44735" anchor="t" anchorCtr="0"/>
+                    <a:bodyPr/>
                     <a:lstStyle>
                       <a:lvl1pPr>
                         <a:defRPr kumimoji="1" sz="1200">
@@ -9172,15 +9117,6 @@
                         </a:rPr>
                         <a:t>16</a:t>
                       </a:r>
-                      <a:endParaRPr kumimoji="0" lang="en-US" altLang="ko-KR" sz="900" b="0" i="0" u="none" strike="noStrike" cap="none" normalizeH="0" baseline="0">
-                        <a:solidFill>
-                          <a:schemeClr val="tx1"/>
-                        </a:solidFill>
-                        <a:effectLst/>
-                        <a:latin typeface="맑은 고딕"/>
-                        <a:ea typeface="맑은 고딕"/>
-                        <a:cs typeface="+mn-cs"/>
-                      </a:endParaRPr>
                     </a:p>
                   </a:txBody>
                   <a:tcPr marL="89475" marR="89475" marT="44736" marB="44736" horzOverflow="overflow">
@@ -9223,7 +9159,7 @@
                 </a:tc>
                 <a:tc>
                   <a:txBody>
-                    <a:bodyPr vert="horz" lIns="89475" tIns="44735" rIns="89475" bIns="44735" anchor="t" anchorCtr="0"/>
+                    <a:bodyPr/>
                     <a:lstStyle>
                       <a:lvl1pPr>
                         <a:defRPr kumimoji="1" sz="1200">
@@ -9380,15 +9316,6 @@
                         </a:rPr>
                         <a:t>17</a:t>
                       </a:r>
-                      <a:endParaRPr kumimoji="0" lang="en-US" altLang="ko-KR" sz="900" b="0" i="0" u="none" strike="noStrike" cap="none" normalizeH="0" baseline="0">
-                        <a:solidFill>
-                          <a:schemeClr val="tx1"/>
-                        </a:solidFill>
-                        <a:effectLst/>
-                        <a:latin typeface="맑은 고딕"/>
-                        <a:ea typeface="맑은 고딕"/>
-                        <a:cs typeface="+mn-cs"/>
-                      </a:endParaRPr>
                     </a:p>
                   </a:txBody>
                   <a:tcPr marL="89475" marR="89475" marT="44736" marB="44736" horzOverflow="overflow">
@@ -9431,7 +9358,7 @@
                 </a:tc>
                 <a:tc>
                   <a:txBody>
-                    <a:bodyPr vert="horz" lIns="89475" tIns="44735" rIns="89475" bIns="44735" anchor="t" anchorCtr="0"/>
+                    <a:bodyPr/>
                     <a:lstStyle>
                       <a:lvl1pPr>
                         <a:defRPr kumimoji="1" sz="1200">
@@ -9579,7 +9506,7 @@
                       <a:r>
                         <a:rPr kumimoji="0" lang="en-US" altLang="ko-KR" sz="900" b="0" i="0" u="none" strike="noStrike" cap="none" normalizeH="0" baseline="0">
                           <a:solidFill>
-                            <a:srgbClr val="0000cc"/>
+                            <a:srgbClr val="0000CC"/>
                           </a:solidFill>
                           <a:effectLst/>
                           <a:latin typeface="맑은 고딕"/>
@@ -9588,15 +9515,6 @@
                         </a:rPr>
                         <a:t>18</a:t>
                       </a:r>
-                      <a:endParaRPr kumimoji="0" lang="en-US" altLang="ko-KR" sz="900" b="0" i="0" u="none" strike="noStrike" cap="none" normalizeH="0" baseline="0">
-                        <a:solidFill>
-                          <a:srgbClr val="0000cc"/>
-                        </a:solidFill>
-                        <a:effectLst/>
-                        <a:latin typeface="맑은 고딕"/>
-                        <a:ea typeface="맑은 고딕"/>
-                        <a:cs typeface="+mn-cs"/>
-                      </a:endParaRPr>
                     </a:p>
                   </a:txBody>
                   <a:tcPr marL="89475" marR="89475" marT="44736" marB="44736" horzOverflow="overflow">
@@ -9637,11 +9555,16 @@
                     <a:noFill/>
                   </a:tcPr>
                 </a:tc>
+                <a:extLst>
+                  <a:ext uri="{0D108BD9-81ED-4DB2-BD59-A6C34878D82A}">
+                    <a16:rowId xmlns:a16="http://schemas.microsoft.com/office/drawing/2014/main" val="10003"/>
+                  </a:ext>
+                </a:extLst>
               </a:tr>
               <a:tr h="1029019">
                 <a:tc>
                   <a:txBody>
-                    <a:bodyPr vert="horz" lIns="89475" tIns="44720" rIns="89475" bIns="44720" anchor="t" anchorCtr="0"/>
+                    <a:bodyPr/>
                     <a:lstStyle>
                       <a:lvl1pPr>
                         <a:defRPr kumimoji="1" sz="1200">
@@ -9789,7 +9712,7 @@
                       <a:r>
                         <a:rPr kumimoji="0" lang="en-US" altLang="ko-KR" sz="900" b="0" i="0" u="none" strike="noStrike" cap="none" normalizeH="0" baseline="0">
                           <a:solidFill>
-                            <a:srgbClr val="ff0000"/>
+                            <a:srgbClr val="FF0000"/>
                           </a:solidFill>
                           <a:effectLst/>
                           <a:latin typeface="맑은 고딕"/>
@@ -9798,15 +9721,6 @@
                         </a:rPr>
                         <a:t>19</a:t>
                       </a:r>
-                      <a:endParaRPr kumimoji="0" lang="en-US" altLang="ko-KR" sz="900" b="0" i="0" u="none" strike="noStrike" cap="none" normalizeH="0" baseline="0">
-                        <a:solidFill>
-                          <a:srgbClr val="ff0000"/>
-                        </a:solidFill>
-                        <a:effectLst/>
-                        <a:latin typeface="맑은 고딕"/>
-                        <a:ea typeface="맑은 고딕"/>
-                        <a:cs typeface="+mn-cs"/>
-                      </a:endParaRPr>
                     </a:p>
                   </a:txBody>
                   <a:tcPr marL="89475" marR="89475" marT="44720" marB="44720" horzOverflow="overflow">
@@ -9849,7 +9763,7 @@
                 </a:tc>
                 <a:tc>
                   <a:txBody>
-                    <a:bodyPr vert="horz" lIns="89475" tIns="44720" rIns="89475" bIns="44720" anchor="t" anchorCtr="0"/>
+                    <a:bodyPr/>
                     <a:lstStyle>
                       <a:lvl1pPr defTabSz="957263">
                         <a:defRPr kumimoji="1" sz="1200">
@@ -10006,15 +9920,6 @@
                         </a:rPr>
                         <a:t>20</a:t>
                       </a:r>
-                      <a:endParaRPr kumimoji="0" lang="en-US" altLang="ko-KR" sz="900" b="0" i="0" u="none" strike="noStrike" cap="none" normalizeH="0" baseline="0">
-                        <a:solidFill>
-                          <a:schemeClr val="tx1"/>
-                        </a:solidFill>
-                        <a:effectLst/>
-                        <a:latin typeface="맑은 고딕"/>
-                        <a:ea typeface="맑은 고딕"/>
-                        <a:cs typeface="+mn-cs"/>
-                      </a:endParaRPr>
                     </a:p>
                   </a:txBody>
                   <a:tcPr marL="89475" marR="89475" marT="44720" marB="44720" horzOverflow="overflow">
@@ -10057,7 +9962,7 @@
                 </a:tc>
                 <a:tc>
                   <a:txBody>
-                    <a:bodyPr vert="horz" lIns="89475" tIns="44720" rIns="89475" bIns="44720" anchor="t" anchorCtr="0"/>
+                    <a:bodyPr/>
                     <a:lstStyle>
                       <a:lvl1pPr defTabSz="957263">
                         <a:defRPr kumimoji="1" sz="1200">
@@ -10214,15 +10119,6 @@
                         </a:rPr>
                         <a:t>21</a:t>
                       </a:r>
-                      <a:endParaRPr kumimoji="0" lang="en-US" altLang="ko-KR" sz="900" b="0" i="0" u="none" strike="noStrike" cap="none" normalizeH="0" baseline="0">
-                        <a:solidFill>
-                          <a:schemeClr val="tx1"/>
-                        </a:solidFill>
-                        <a:effectLst/>
-                        <a:latin typeface="맑은 고딕"/>
-                        <a:ea typeface="맑은 고딕"/>
-                        <a:cs typeface="+mn-cs"/>
-                      </a:endParaRPr>
                     </a:p>
                   </a:txBody>
                   <a:tcPr marL="89475" marR="89475" marT="44720" marB="44720" horzOverflow="overflow">
@@ -10265,7 +10161,7 @@
                 </a:tc>
                 <a:tc>
                   <a:txBody>
-                    <a:bodyPr vert="horz" lIns="89475" tIns="44735" rIns="89475" bIns="44735" anchor="t" anchorCtr="0"/>
+                    <a:bodyPr/>
                     <a:lstStyle>
                       <a:lvl1pPr defTabSz="957263">
                         <a:defRPr kumimoji="1" sz="1200">
@@ -10422,15 +10318,6 @@
                         </a:rPr>
                         <a:t>22</a:t>
                       </a:r>
-                      <a:endParaRPr kumimoji="0" lang="en-US" altLang="ko-KR" sz="900" b="0" i="0" u="none" strike="noStrike" cap="none" normalizeH="0" baseline="0">
-                        <a:solidFill>
-                          <a:schemeClr val="tx1"/>
-                        </a:solidFill>
-                        <a:effectLst/>
-                        <a:latin typeface="맑은 고딕"/>
-                        <a:ea typeface="맑은 고딕"/>
-                        <a:cs typeface="+mn-cs"/>
-                      </a:endParaRPr>
                     </a:p>
                   </a:txBody>
                   <a:tcPr marL="89475" marR="89475" marT="44736" marB="44736" horzOverflow="overflow">
@@ -10473,7 +10360,7 @@
                 </a:tc>
                 <a:tc>
                   <a:txBody>
-                    <a:bodyPr vert="horz" lIns="89475" tIns="44735" rIns="89475" bIns="44735" anchor="t" anchorCtr="0"/>
+                    <a:bodyPr/>
                     <a:lstStyle>
                       <a:lvl1pPr>
                         <a:defRPr kumimoji="1" sz="1200">
@@ -10630,15 +10517,6 @@
                         </a:rPr>
                         <a:t>23</a:t>
                       </a:r>
-                      <a:endParaRPr kumimoji="0" lang="en-US" altLang="ko-KR" sz="900" b="0" i="0" u="none" strike="noStrike" cap="none" normalizeH="0" baseline="0">
-                        <a:solidFill>
-                          <a:schemeClr val="tx1"/>
-                        </a:solidFill>
-                        <a:effectLst/>
-                        <a:latin typeface="맑은 고딕"/>
-                        <a:ea typeface="맑은 고딕"/>
-                        <a:cs typeface="+mn-cs"/>
-                      </a:endParaRPr>
                     </a:p>
                   </a:txBody>
                   <a:tcPr marL="89475" marR="89475" marT="44736" marB="44736" horzOverflow="overflow">
@@ -10681,7 +10559,7 @@
                 </a:tc>
                 <a:tc>
                   <a:txBody>
-                    <a:bodyPr vert="horz" lIns="89475" tIns="44735" rIns="89475" bIns="44735" anchor="t" anchorCtr="0"/>
+                    <a:bodyPr/>
                     <a:lstStyle>
                       <a:lvl1pPr>
                         <a:defRPr kumimoji="1" sz="1200">
@@ -10838,15 +10716,6 @@
                         </a:rPr>
                         <a:t>24</a:t>
                       </a:r>
-                      <a:endParaRPr kumimoji="0" lang="en-US" altLang="ko-KR" sz="900" b="0" i="0" u="none" strike="noStrike" cap="none" normalizeH="0" baseline="0">
-                        <a:solidFill>
-                          <a:schemeClr val="tx1"/>
-                        </a:solidFill>
-                        <a:effectLst/>
-                        <a:latin typeface="맑은 고딕"/>
-                        <a:ea typeface="맑은 고딕"/>
-                        <a:cs typeface="+mn-cs"/>
-                      </a:endParaRPr>
                     </a:p>
                   </a:txBody>
                   <a:tcPr marL="89475" marR="89475" marT="44736" marB="44736" horzOverflow="overflow">
@@ -10889,7 +10758,7 @@
                 </a:tc>
                 <a:tc>
                   <a:txBody>
-                    <a:bodyPr vert="horz" lIns="89475" tIns="44735" rIns="89475" bIns="44735" anchor="t" anchorCtr="0"/>
+                    <a:bodyPr/>
                     <a:lstStyle>
                       <a:lvl1pPr>
                         <a:defRPr kumimoji="1" sz="1200">
@@ -11037,7 +10906,7 @@
                       <a:r>
                         <a:rPr kumimoji="0" lang="en-US" altLang="ko-KR" sz="900" b="0" i="0" u="none" strike="noStrike" cap="none" normalizeH="0" baseline="0">
                           <a:solidFill>
-                            <a:srgbClr val="0000cc"/>
+                            <a:srgbClr val="0000CC"/>
                           </a:solidFill>
                           <a:effectLst/>
                           <a:latin typeface="맑은 고딕"/>
@@ -11046,15 +10915,6 @@
                         </a:rPr>
                         <a:t>25</a:t>
                       </a:r>
-                      <a:endParaRPr kumimoji="0" lang="en-US" altLang="ko-KR" sz="900" b="0" i="0" u="none" strike="noStrike" cap="none" normalizeH="0" baseline="0">
-                        <a:solidFill>
-                          <a:srgbClr val="0000cc"/>
-                        </a:solidFill>
-                        <a:effectLst/>
-                        <a:latin typeface="맑은 고딕"/>
-                        <a:ea typeface="맑은 고딕"/>
-                        <a:cs typeface="+mn-cs"/>
-                      </a:endParaRPr>
                     </a:p>
                   </a:txBody>
                   <a:tcPr marL="89475" marR="89475" marT="44736" marB="44736" horzOverflow="overflow">
@@ -11095,11 +10955,16 @@
                     <a:noFill/>
                   </a:tcPr>
                 </a:tc>
+                <a:extLst>
+                  <a:ext uri="{0D108BD9-81ED-4DB2-BD59-A6C34878D82A}">
+                    <a16:rowId xmlns:a16="http://schemas.microsoft.com/office/drawing/2014/main" val="10004"/>
+                  </a:ext>
+                </a:extLst>
               </a:tr>
               <a:tr h="837329">
                 <a:tc>
                   <a:txBody>
-                    <a:bodyPr vert="horz" lIns="89475" tIns="44720" rIns="89475" bIns="44720" anchor="t" anchorCtr="0"/>
+                    <a:bodyPr/>
                     <a:lstStyle>
                       <a:lvl1pPr>
                         <a:defRPr kumimoji="1" sz="1200">
@@ -11247,7 +11112,7 @@
                       <a:r>
                         <a:rPr kumimoji="0" lang="en-US" altLang="ko-KR" sz="900" b="0" i="0" u="none" strike="noStrike" cap="none" normalizeH="0" baseline="0">
                           <a:solidFill>
-                            <a:srgbClr val="ff0000"/>
+                            <a:srgbClr val="FF0000"/>
                           </a:solidFill>
                           <a:effectLst/>
                           <a:latin typeface="맑은 고딕"/>
@@ -11256,15 +11121,6 @@
                         </a:rPr>
                         <a:t>26</a:t>
                       </a:r>
-                      <a:endParaRPr kumimoji="0" lang="en-US" altLang="ko-KR" sz="900" b="0" i="0" u="none" strike="noStrike" cap="none" normalizeH="0" baseline="0">
-                        <a:solidFill>
-                          <a:srgbClr val="ff0000"/>
-                        </a:solidFill>
-                        <a:effectLst/>
-                        <a:latin typeface="맑은 고딕"/>
-                        <a:ea typeface="맑은 고딕"/>
-                        <a:cs typeface="+mn-cs"/>
-                      </a:endParaRPr>
                     </a:p>
                   </a:txBody>
                   <a:tcPr marL="89475" marR="89475" marT="44720" marB="44720" horzOverflow="overflow">
@@ -11307,7 +11163,7 @@
                 </a:tc>
                 <a:tc>
                   <a:txBody>
-                    <a:bodyPr vert="horz" lIns="89475" tIns="44720" rIns="89475" bIns="44720" anchor="t" anchorCtr="0"/>
+                    <a:bodyPr/>
                     <a:lstStyle>
                       <a:lvl1pPr defTabSz="957263">
                         <a:defRPr kumimoji="1" sz="1200">
@@ -11464,15 +11320,6 @@
                         </a:rPr>
                         <a:t>27</a:t>
                       </a:r>
-                      <a:endParaRPr kumimoji="0" lang="en-US" altLang="ko-KR" sz="900" b="0" i="0" u="none" strike="noStrike" cap="none" normalizeH="0" baseline="0">
-                        <a:solidFill>
-                          <a:schemeClr val="tx1"/>
-                        </a:solidFill>
-                        <a:effectLst/>
-                        <a:latin typeface="맑은 고딕"/>
-                        <a:ea typeface="맑은 고딕"/>
-                        <a:cs typeface="+mn-cs"/>
-                      </a:endParaRPr>
                     </a:p>
                   </a:txBody>
                   <a:tcPr marL="89475" marR="89475" marT="44720" marB="44720" horzOverflow="overflow">
@@ -11515,7 +11362,7 @@
                 </a:tc>
                 <a:tc>
                   <a:txBody>
-                    <a:bodyPr vert="horz" lIns="89475" tIns="44720" rIns="89475" bIns="44720" anchor="t" anchorCtr="0"/>
+                    <a:bodyPr/>
                     <a:lstStyle>
                       <a:lvl1pPr defTabSz="957263">
                         <a:defRPr kumimoji="1" sz="1200">
@@ -11672,15 +11519,6 @@
                         </a:rPr>
                         <a:t>28</a:t>
                       </a:r>
-                      <a:endParaRPr kumimoji="0" lang="en-US" altLang="ko-KR" sz="900" b="0" i="0" u="none" strike="noStrike" cap="none" normalizeH="0" baseline="0">
-                        <a:solidFill>
-                          <a:schemeClr val="tx1"/>
-                        </a:solidFill>
-                        <a:effectLst/>
-                        <a:latin typeface="맑은 고딕"/>
-                        <a:ea typeface="맑은 고딕"/>
-                        <a:cs typeface="+mn-cs"/>
-                      </a:endParaRPr>
                     </a:p>
                   </a:txBody>
                   <a:tcPr marL="89475" marR="89475" marT="44720" marB="44720" horzOverflow="overflow">
@@ -11723,7 +11561,7 @@
                 </a:tc>
                 <a:tc>
                   <a:txBody>
-                    <a:bodyPr vert="horz" lIns="89475" tIns="44735" rIns="89475" bIns="44735" anchor="t" anchorCtr="0"/>
+                    <a:bodyPr/>
                     <a:lstStyle>
                       <a:lvl1pPr defTabSz="957263">
                         <a:defRPr kumimoji="1" sz="1200">
@@ -11880,15 +11718,6 @@
                         </a:rPr>
                         <a:t>29</a:t>
                       </a:r>
-                      <a:endParaRPr kumimoji="0" lang="en-US" altLang="ko-KR" sz="900" b="0" i="0" u="none" strike="noStrike" cap="none" normalizeH="0" baseline="0">
-                        <a:solidFill>
-                          <a:schemeClr val="tx1"/>
-                        </a:solidFill>
-                        <a:effectLst/>
-                        <a:latin typeface="맑은 고딕"/>
-                        <a:ea typeface="맑은 고딕"/>
-                        <a:cs typeface="+mn-cs"/>
-                      </a:endParaRPr>
                     </a:p>
                   </a:txBody>
                   <a:tcPr marL="89475" marR="89475" marT="44736" marB="44736" horzOverflow="overflow">
@@ -11931,7 +11760,7 @@
                 </a:tc>
                 <a:tc>
                   <a:txBody>
-                    <a:bodyPr vert="horz" lIns="89475" tIns="44735" rIns="89475" bIns="44735" anchor="t" anchorCtr="0"/>
+                    <a:bodyPr/>
                     <a:lstStyle>
                       <a:lvl1pPr>
                         <a:defRPr kumimoji="1" sz="1200">
@@ -12088,15 +11917,6 @@
                         </a:rPr>
                         <a:t>30</a:t>
                       </a:r>
-                      <a:endParaRPr kumimoji="0" lang="en-US" altLang="ko-KR" sz="900" b="0" i="0" u="none" strike="noStrike" cap="none" normalizeH="0" baseline="0">
-                        <a:solidFill>
-                          <a:schemeClr val="tx1"/>
-                        </a:solidFill>
-                        <a:effectLst/>
-                        <a:latin typeface="맑은 고딕"/>
-                        <a:ea typeface="맑은 고딕"/>
-                        <a:cs typeface="+mn-cs"/>
-                      </a:endParaRPr>
                     </a:p>
                   </a:txBody>
                   <a:tcPr marL="89475" marR="89475" marT="44736" marB="44736" horzOverflow="overflow">
@@ -12139,7 +11959,7 @@
                 </a:tc>
                 <a:tc>
                   <a:txBody>
-                    <a:bodyPr vert="horz" lIns="89475" tIns="44735" rIns="89475" bIns="44735" anchor="t" anchorCtr="0"/>
+                    <a:bodyPr/>
                     <a:lstStyle>
                       <a:lvl1pPr>
                         <a:defRPr kumimoji="1" sz="1200">
@@ -12296,15 +12116,6 @@
                         </a:rPr>
                         <a:t>31</a:t>
                       </a:r>
-                      <a:endParaRPr kumimoji="0" lang="en-US" altLang="ko-KR" sz="900" b="0" i="0" u="none" strike="noStrike" cap="none" normalizeH="0" baseline="0">
-                        <a:solidFill>
-                          <a:schemeClr val="tx1"/>
-                        </a:solidFill>
-                        <a:effectLst/>
-                        <a:latin typeface="맑은 고딕"/>
-                        <a:ea typeface="맑은 고딕"/>
-                        <a:cs typeface="+mn-cs"/>
-                      </a:endParaRPr>
                     </a:p>
                   </a:txBody>
                   <a:tcPr marL="89475" marR="89475" marT="44736" marB="44736" horzOverflow="overflow">
@@ -12347,7 +12158,7 @@
                 </a:tc>
                 <a:tc>
                   <a:txBody>
-                    <a:bodyPr vert="horz" lIns="89475" tIns="44735" rIns="89475" bIns="44735" anchor="t" anchorCtr="0"/>
+                    <a:bodyPr/>
                     <a:lstStyle>
                       <a:lvl1pPr>
                         <a:defRPr kumimoji="1" sz="1200">
@@ -12494,7 +12305,7 @@
                       </a:pPr>
                       <a:endParaRPr kumimoji="0" lang="en-US" altLang="ko-KR" sz="900" b="0" i="0" u="none" strike="noStrike" cap="none" normalizeH="0" baseline="0">
                         <a:solidFill>
-                          <a:srgbClr val="0000cc"/>
+                          <a:srgbClr val="0000CC"/>
                         </a:solidFill>
                         <a:effectLst/>
                         <a:latin typeface="맑은 고딕"/>
@@ -12541,6 +12352,11 @@
                     <a:noFill/>
                   </a:tcPr>
                 </a:tc>
+                <a:extLst>
+                  <a:ext uri="{0D108BD9-81ED-4DB2-BD59-A6C34878D82A}">
+                    <a16:rowId xmlns:a16="http://schemas.microsoft.com/office/drawing/2014/main" val="10005"/>
+                  </a:ext>
+                </a:extLst>
               </a:tr>
             </a:tbl>
           </a:graphicData>
@@ -12551,11 +12367,11 @@
   <p:clrMapOvr>
     <a:masterClrMapping/>
   </p:clrMapOvr>
-  <mc:AlternateContent xmlns:mc="http://schemas.openxmlformats.org/markup-compatibility/2006">
-    <mc:Choice xmlns:p14="http://schemas.microsoft.com/office/powerpoint/2010/main" Requires="p14">
-      <p:transition xmlns:mc="http://schemas.openxmlformats.org/markup-compatibility/2006" xmlns:p14="http://schemas.microsoft.com/office/powerpoint/2010/main" mc:Ignorable="p14" p14:dur="500"/>
+  <mc:AlternateContent xmlns:mc="http://schemas.openxmlformats.org/markup-compatibility/2006" xmlns:p14="http://schemas.microsoft.com/office/powerpoint/2010/main">
+    <mc:Choice Requires="p14">
+      <p:transition/>
     </mc:Choice>
-    <mc:Fallback>
+    <mc:Fallback xmlns:dsp="http://schemas.microsoft.com/office/drawing/2008/diagram" xmlns:dgm="http://schemas.openxmlformats.org/drawingml/2006/diagram" xmlns:c="http://schemas.openxmlformats.org/drawingml/2006/chart" xmlns="">
       <p:transition/>
     </mc:Fallback>
   </mc:AlternateContent>
@@ -12570,14 +12386,14 @@
 </file>
 
 <file path=ppt/theme/theme1.xml><?xml version="1.0" encoding="utf-8"?>
-<a:theme xmlns:r="http://schemas.openxmlformats.org/officeDocument/2006/relationships" xmlns:c="http://schemas.openxmlformats.org/drawingml/2006/chart" xmlns:dgm="http://schemas.openxmlformats.org/drawingml/2006/diagram" xmlns:dsp="http://schemas.microsoft.com/office/drawing/2008/diagram" xmlns:a="http://schemas.openxmlformats.org/drawingml/2006/main" xmlns:pic="http://schemas.openxmlformats.org/drawingml/2006/picture" xmlns:wp="http://schemas.openxmlformats.org/drawingml/2006/wordprocessingDrawing" xmlns:xdr="http://schemas.openxmlformats.org/drawingml/2006/spreadsheetDrawing" xmlns:p="http://schemas.openxmlformats.org/presentationml/2006/main" name="S-Oil SO Proposal_인프라_0814_V1.1">
+<a:theme xmlns:a="http://schemas.openxmlformats.org/drawingml/2006/main" name="S-Oil SO Proposal_인프라_0814_V1.1">
   <a:themeElements>
     <a:clrScheme name="S-Oil SO Proposal_인프라_0814_V1.1 1">
       <a:dk1>
         <a:srgbClr val="000000"/>
       </a:dk1>
       <a:lt1>
-        <a:srgbClr val="ffffff"/>
+        <a:srgbClr val="FFFFFF"/>
       </a:lt1>
       <a:dk2>
         <a:srgbClr val="000000"/>
@@ -12586,28 +12402,28 @@
         <a:srgbClr val="808080"/>
       </a:lt2>
       <a:accent1>
-        <a:srgbClr val="bbe0e3"/>
+        <a:srgbClr val="BBE0E3"/>
       </a:accent1>
       <a:accent2>
         <a:srgbClr val="333399"/>
       </a:accent2>
       <a:accent3>
-        <a:srgbClr val="ffffff"/>
+        <a:srgbClr val="FFFFFF"/>
       </a:accent3>
       <a:accent4>
         <a:srgbClr val="000000"/>
       </a:accent4>
       <a:accent5>
-        <a:srgbClr val="daedef"/>
+        <a:srgbClr val="DAEDEF"/>
       </a:accent5>
       <a:accent6>
-        <a:srgbClr val="2d2d8a"/>
+        <a:srgbClr val="2D2D8A"/>
       </a:accent6>
       <a:hlink>
         <a:srgbClr val="009999"/>
       </a:hlink>
       <a:folHlink>
-        <a:srgbClr val="99cc00"/>
+        <a:srgbClr val="99CC00"/>
       </a:folHlink>
     </a:clrScheme>
     <a:fontScheme name="S-Oil SO Proposal_인프라_0814_V1.1">
@@ -12894,18 +12710,19 @@
       <a:lstStyle/>
     </a:txDef>
   </a:objectDefaults>
+  <a:extraClrSchemeLst/>
 </a:theme>
 </file>
 
 <file path=ppt/theme/theme2.xml><?xml version="1.0" encoding="utf-8"?>
-<a:theme xmlns:r="http://schemas.openxmlformats.org/officeDocument/2006/relationships" xmlns:c="http://schemas.openxmlformats.org/drawingml/2006/chart" xmlns:dgm="http://schemas.openxmlformats.org/drawingml/2006/diagram" xmlns:dsp="http://schemas.microsoft.com/office/drawing/2008/diagram" xmlns:a="http://schemas.openxmlformats.org/drawingml/2006/main" xmlns:pic="http://schemas.openxmlformats.org/drawingml/2006/picture" xmlns:wp="http://schemas.openxmlformats.org/drawingml/2006/wordprocessingDrawing" xmlns:xdr="http://schemas.openxmlformats.org/drawingml/2006/spreadsheetDrawing" xmlns:p="http://schemas.openxmlformats.org/presentationml/2006/main" name="Office 테마">
+<a:theme xmlns:a="http://schemas.openxmlformats.org/drawingml/2006/main" name="Office 테마">
   <a:themeElements>
     <a:clrScheme name="">
       <a:dk1>
         <a:srgbClr val="000000"/>
       </a:dk1>
       <a:lt1>
-        <a:srgbClr val="ffffff"/>
+        <a:srgbClr val="FFFFFF"/>
       </a:lt1>
       <a:dk2>
         <a:srgbClr val="000000"/>
@@ -12914,28 +12731,28 @@
         <a:srgbClr val="808080"/>
       </a:lt2>
       <a:accent1>
-        <a:srgbClr val="bbe0e3"/>
+        <a:srgbClr val="BBE0E3"/>
       </a:accent1>
       <a:accent2>
         <a:srgbClr val="333399"/>
       </a:accent2>
       <a:accent3>
-        <a:srgbClr val="ffffff"/>
+        <a:srgbClr val="FFFFFF"/>
       </a:accent3>
       <a:accent4>
         <a:srgbClr val="000000"/>
       </a:accent4>
       <a:accent5>
-        <a:srgbClr val="daedef"/>
+        <a:srgbClr val="DAEDEF"/>
       </a:accent5>
       <a:accent6>
-        <a:srgbClr val="2d2d8a"/>
+        <a:srgbClr val="2D2D8A"/>
       </a:accent6>
       <a:hlink>
         <a:srgbClr val="009999"/>
       </a:hlink>
       <a:folHlink>
-        <a:srgbClr val="99cc00"/>
+        <a:srgbClr val="99CC00"/>
       </a:folHlink>
     </a:clrScheme>
     <a:fontScheme name="Office">
@@ -13175,18 +12992,20 @@
       </a:bgFillStyleLst>
     </a:fmtScheme>
   </a:themeElements>
+  <a:objectDefaults/>
+  <a:extraClrSchemeLst/>
 </a:theme>
 </file>
 
 <file path=ppt/theme/theme3.xml><?xml version="1.0" encoding="utf-8"?>
-<a:theme xmlns:r="http://schemas.openxmlformats.org/officeDocument/2006/relationships" xmlns:c="http://schemas.openxmlformats.org/drawingml/2006/chart" xmlns:dgm="http://schemas.openxmlformats.org/drawingml/2006/diagram" xmlns:dsp="http://schemas.microsoft.com/office/drawing/2008/diagram" xmlns:a="http://schemas.openxmlformats.org/drawingml/2006/main" xmlns:pic="http://schemas.openxmlformats.org/drawingml/2006/picture" xmlns:wp="http://schemas.openxmlformats.org/drawingml/2006/wordprocessingDrawing" xmlns:xdr="http://schemas.openxmlformats.org/drawingml/2006/spreadsheetDrawing" xmlns:p="http://schemas.openxmlformats.org/presentationml/2006/main" name="Office 테마">
+<a:theme xmlns:a="http://schemas.openxmlformats.org/drawingml/2006/main" name="Office 테마">
   <a:themeElements>
     <a:clrScheme name="">
       <a:dk1>
         <a:srgbClr val="000000"/>
       </a:dk1>
       <a:lt1>
-        <a:srgbClr val="ffffff"/>
+        <a:srgbClr val="FFFFFF"/>
       </a:lt1>
       <a:dk2>
         <a:srgbClr val="000000"/>
@@ -13195,28 +13014,28 @@
         <a:srgbClr val="808080"/>
       </a:lt2>
       <a:accent1>
-        <a:srgbClr val="bbe0e3"/>
+        <a:srgbClr val="BBE0E3"/>
       </a:accent1>
       <a:accent2>
         <a:srgbClr val="333399"/>
       </a:accent2>
       <a:accent3>
-        <a:srgbClr val="ffffff"/>
+        <a:srgbClr val="FFFFFF"/>
       </a:accent3>
       <a:accent4>
         <a:srgbClr val="000000"/>
       </a:accent4>
       <a:accent5>
-        <a:srgbClr val="daedef"/>
+        <a:srgbClr val="DAEDEF"/>
       </a:accent5>
       <a:accent6>
-        <a:srgbClr val="2d2d8a"/>
+        <a:srgbClr val="2D2D8A"/>
       </a:accent6>
       <a:hlink>
         <a:srgbClr val="009999"/>
       </a:hlink>
       <a:folHlink>
-        <a:srgbClr val="99cc00"/>
+        <a:srgbClr val="99CC00"/>
       </a:folHlink>
     </a:clrScheme>
     <a:fontScheme name="Office">
@@ -13456,5 +13275,7 @@
       </a:bgFillStyleLst>
     </a:fmtScheme>
   </a:themeElements>
+  <a:objectDefaults/>
+  <a:extraClrSchemeLst/>
 </a:theme>
 </file>
</xml_diff>

<commit_message>
[2023-04-18] RMS(v3.2) 배포 버전 백업
</commit_message>
<xml_diff>
--- a/src/main/webapp/WEB-INF/Files/2023-03/calendar03.pptx
+++ b/src/main/webapp/WEB-INF/Files/2023-03/calendar03.pptx
@@ -1,17 +1,17 @@
 
 <file path=ppt/presentation.xml><?xml version="1.0" encoding="utf-8"?>
-<p:presentation xmlns:r="http://schemas.openxmlformats.org/officeDocument/2006/relationships" xmlns:c="http://schemas.openxmlformats.org/drawingml/2006/chart" xmlns:a="http://schemas.openxmlformats.org/drawingml/2006/main" xmlns:dgm="http://schemas.openxmlformats.org/drawingml/2006/diagram" xmlns:dsp="http://schemas.microsoft.com/office/drawing/2008/diagram" xmlns:p="http://schemas.openxmlformats.org/presentationml/2006/main" showSpecialPlsOnTitleSld="0" strictFirstAndLastChars="0" saveSubsetFonts="1">
+<p:presentation xmlns:a="http://schemas.openxmlformats.org/drawingml/2006/main" xmlns:r="http://schemas.openxmlformats.org/officeDocument/2006/relationships" xmlns:p="http://schemas.openxmlformats.org/presentationml/2006/main" showSpecialPlsOnTitleSld="0" strictFirstAndLastChars="0" saveSubsetFonts="1">
   <p:sldMasterIdLst>
     <p:sldMasterId id="2147521141" r:id="rId1"/>
   </p:sldMasterIdLst>
   <p:notesMasterIdLst>
-    <p:notesMasterId r:id="rId2"/>
+    <p:notesMasterId r:id="rId3"/>
   </p:notesMasterIdLst>
   <p:handoutMasterIdLst>
-    <p:handoutMasterId r:id="rId3"/>
+    <p:handoutMasterId r:id="rId4"/>
   </p:handoutMasterIdLst>
   <p:sldIdLst>
-    <p:sldId id="256" r:id="rId4"/>
+    <p:sldId id="256" r:id="rId2"/>
   </p:sldIdLst>
   <p:sldSz cx="9906000" cy="6858000" type="A4"/>
   <p:notesSz cx="6797675" cy="9926638"/>
@@ -140,17 +140,48 @@
       </a:defRPr>
     </a:lvl9pPr>
   </p:defaultTextStyle>
+  <p:extLst>
+    <p:ext uri="{EFAFB233-063F-42B5-8137-9DF3F51BA10A}">
+      <p15:sldGuideLst xmlns:p15="http://schemas.microsoft.com/office/powerpoint/2012/main">
+        <p15:guide id="1" orient="horz" pos="2447">
+          <p15:clr>
+            <a:srgbClr val="A4A3A4"/>
+          </p15:clr>
+        </p15:guide>
+        <p15:guide id="2" pos="3119">
+          <p15:clr>
+            <a:srgbClr val="A4A3A4"/>
+          </p15:clr>
+        </p15:guide>
+      </p15:sldGuideLst>
+    </p:ext>
+    <p:ext uri="{2D200454-40CA-4A62-9FC3-DE9A4176ACB9}">
+      <p15:notesGuideLst xmlns:p15="http://schemas.microsoft.com/office/powerpoint/2012/main">
+        <p15:guide id="1" orient="horz" pos="3125">
+          <p15:clr>
+            <a:srgbClr val="A4A3A4"/>
+          </p15:clr>
+        </p15:guide>
+        <p15:guide id="2" pos="2139">
+          <p15:clr>
+            <a:srgbClr val="A4A3A4"/>
+          </p15:clr>
+        </p15:guide>
+      </p15:notesGuideLst>
+    </p:ext>
+  </p:extLst>
 </p:presentation>
 </file>
 
 <file path=ppt/handoutMasters/handoutMaster1.xml><?xml version="1.0" encoding="utf-8"?>
-<p:handoutMaster xmlns:r="http://schemas.openxmlformats.org/officeDocument/2006/relationships" xmlns:c="http://schemas.openxmlformats.org/drawingml/2006/chart" xmlns:a="http://schemas.openxmlformats.org/drawingml/2006/main" xmlns:dgm="http://schemas.openxmlformats.org/drawingml/2006/diagram" xmlns:dsp="http://schemas.microsoft.com/office/drawing/2008/diagram" xmlns:p="http://schemas.openxmlformats.org/presentationml/2006/main">
+<p:handoutMaster xmlns:a="http://schemas.openxmlformats.org/drawingml/2006/main" xmlns:r="http://schemas.openxmlformats.org/officeDocument/2006/relationships" xmlns:p="http://schemas.openxmlformats.org/presentationml/2006/main">
   <p:cSld>
     <p:bg>
-      <p:bgPr shadeToTitle="0">
+      <p:bgPr>
         <a:solidFill>
           <a:schemeClr val="bg1"/>
         </a:solidFill>
+        <a:effectLst/>
       </p:bgPr>
     </p:bg>
     <p:spTree>
@@ -174,7 +205,7 @@
             <a:spLocks noGrp="1" noChangeArrowheads="1"/>
           </p:cNvSpPr>
           <p:nvPr>
-            <p:ph type="hdr" sz="quarter" idx="0"/>
+            <p:ph type="hdr" sz="quarter"/>
           </p:nvPr>
         </p:nvSpPr>
         <p:spPr>
@@ -216,10 +247,6 @@
             <a:pPr>
               <a:defRPr/>
             </a:pPr>
-            <a:r>
-              <a:rPr lang="ko-KR" altLang="en-US"/>
-              <a:t/>
-            </a:r>
             <a:endParaRPr lang="ko-KR" altLang="en-US"/>
           </a:p>
         </p:txBody>
@@ -278,7 +305,7 @@
               <a:pPr>
                 <a:defRPr/>
               </a:pPr>
-              <a:t>2023-03-02</a:t>
+              <a:t>2023-03-10</a:t>
             </a:fld>
             <a:endParaRPr lang="en-US" altLang="ko-KR"/>
           </a:p>
@@ -404,13 +431,14 @@
 </file>
 
 <file path=ppt/notesMasters/notesMaster1.xml><?xml version="1.0" encoding="utf-8"?>
-<p:notesMaster xmlns:r="http://schemas.openxmlformats.org/officeDocument/2006/relationships" xmlns:c="http://schemas.openxmlformats.org/drawingml/2006/chart" xmlns:a="http://schemas.openxmlformats.org/drawingml/2006/main" xmlns:dgm="http://schemas.openxmlformats.org/drawingml/2006/diagram" xmlns:dsp="http://schemas.microsoft.com/office/drawing/2008/diagram" xmlns:p="http://schemas.openxmlformats.org/presentationml/2006/main">
+<p:notesMaster xmlns:a="http://schemas.openxmlformats.org/drawingml/2006/main" xmlns:r="http://schemas.openxmlformats.org/officeDocument/2006/relationships" xmlns:p="http://schemas.openxmlformats.org/presentationml/2006/main">
   <p:cSld>
     <p:bg>
-      <p:bgPr shadeToTitle="0">
+      <p:bgPr>
         <a:solidFill>
           <a:schemeClr val="bg1"/>
         </a:solidFill>
+        <a:effectLst/>
       </p:bgPr>
     </p:bg>
     <p:spTree>
@@ -434,7 +462,7 @@
             <a:spLocks noGrp="1" noChangeArrowheads="1"/>
           </p:cNvSpPr>
           <p:nvPr>
-            <p:ph type="hdr" sz="quarter" idx="0"/>
+            <p:ph type="hdr" sz="quarter"/>
           </p:nvPr>
         </p:nvSpPr>
         <p:spPr>
@@ -476,10 +504,6 @@
             <a:pPr>
               <a:defRPr/>
             </a:pPr>
-            <a:r>
-              <a:rPr lang="ko-KR" altLang="en-US"/>
-              <a:t/>
-            </a:r>
             <a:endParaRPr lang="ko-KR" altLang="en-US"/>
           </a:p>
         </p:txBody>
@@ -538,7 +562,7 @@
               <a:pPr>
                 <a:defRPr/>
               </a:pPr>
-              <a:t>2023-03-02</a:t>
+              <a:t>2023-03-10</a:t>
             </a:fld>
             <a:endParaRPr lang="en-US" altLang="ko-KR"/>
           </a:p>
@@ -610,7 +634,6 @@
               <a:rPr lang="en-US" altLang="ko-KR"/>
               <a:t>Click to edit Master text styles</a:t>
             </a:r>
-            <a:endParaRPr lang="en-US" altLang="ko-KR"/>
           </a:p>
           <a:p>
             <a:pPr lvl="1">
@@ -620,7 +643,6 @@
               <a:rPr lang="en-US" altLang="ko-KR"/>
               <a:t>Second level</a:t>
             </a:r>
-            <a:endParaRPr lang="en-US" altLang="ko-KR"/>
           </a:p>
           <a:p>
             <a:pPr lvl="2">
@@ -630,7 +652,6 @@
               <a:rPr lang="en-US" altLang="ko-KR"/>
               <a:t>Third level</a:t>
             </a:r>
-            <a:endParaRPr lang="en-US" altLang="ko-KR"/>
           </a:p>
           <a:p>
             <a:pPr lvl="3">
@@ -640,7 +661,6 @@
               <a:rPr lang="en-US" altLang="ko-KR"/>
               <a:t>Fourth level</a:t>
             </a:r>
-            <a:endParaRPr lang="en-US" altLang="ko-KR"/>
           </a:p>
           <a:p>
             <a:pPr lvl="4">
@@ -650,7 +670,6 @@
               <a:rPr lang="en-US" altLang="ko-KR"/>
               <a:t>Fifth level</a:t>
             </a:r>
-            <a:endParaRPr lang="en-US" altLang="ko-KR"/>
           </a:p>
         </p:txBody>
       </p:sp>
@@ -897,7 +916,7 @@
 </file>
 
 <file path=ppt/notesSlides/notesSlide1.xml><?xml version="1.0" encoding="utf-8"?>
-<p:notes xmlns:r="http://schemas.openxmlformats.org/officeDocument/2006/relationships" xmlns:c="http://schemas.openxmlformats.org/drawingml/2006/chart" xmlns:a="http://schemas.openxmlformats.org/drawingml/2006/main" xmlns:dgm="http://schemas.openxmlformats.org/drawingml/2006/diagram" xmlns:dsp="http://schemas.microsoft.com/office/drawing/2008/diagram" xmlns:p="http://schemas.openxmlformats.org/presentationml/2006/main">
+<p:notes xmlns:a="http://schemas.openxmlformats.org/drawingml/2006/main" xmlns:r="http://schemas.openxmlformats.org/officeDocument/2006/relationships" xmlns:p="http://schemas.openxmlformats.org/presentationml/2006/main">
   <p:cSld>
     <p:spTree>
       <p:nvGrpSpPr>
@@ -920,7 +939,7 @@
             <a:spLocks noGrp="1" noRot="1" noChangeAspect="1" noChangeArrowheads="1" noTextEdit="1"/>
           </p:cNvSpPr>
           <p:nvPr>
-            <p:ph type="sldImg" idx="0"/>
+            <p:ph type="sldImg"/>
           </p:nvPr>
         </p:nvSpPr>
         <p:spPr>
@@ -952,10 +971,6 @@
             <a:pPr eaLnBrk="1" hangingPunct="1">
               <a:defRPr/>
             </a:pPr>
-            <a:r>
-              <a:rPr lang="ko-KR" altLang="en-US"/>
-              <a:t/>
-            </a:r>
             <a:endParaRPr lang="ko-KR" altLang="en-US"/>
           </a:p>
         </p:txBody>
@@ -3560,7 +3575,7 @@
 </file>
 
 <file path=ppt/slides/slide1.xml><?xml version="1.0" encoding="utf-8"?>
-<p:sld xmlns:r="http://schemas.openxmlformats.org/officeDocument/2006/relationships" xmlns:c="http://schemas.openxmlformats.org/drawingml/2006/chart" xmlns:a="http://schemas.openxmlformats.org/drawingml/2006/main" xmlns:dgm="http://schemas.openxmlformats.org/drawingml/2006/diagram" xmlns:dsp="http://schemas.microsoft.com/office/drawing/2008/diagram" xmlns:p="http://schemas.openxmlformats.org/presentationml/2006/main">
+<p:sld xmlns:a="http://schemas.openxmlformats.org/drawingml/2006/main" xmlns:r="http://schemas.openxmlformats.org/officeDocument/2006/relationships" xmlns:p="http://schemas.openxmlformats.org/presentationml/2006/main">
   <p:cSld>
     <p:spTree>
       <p:nvGrpSpPr>
@@ -3713,15 +3728,31 @@
               <a:defRPr/>
             </a:pPr>
             <a:r>
+              <a:rPr kumimoji="1" lang="en-US" altLang="ko-KR" sz="1566" dirty="0">
+                <a:solidFill>
+                  <a:schemeClr val="tx1"/>
+                </a:solidFill>
+              </a:rPr>
+              <a:t>1 . Business Calendar </a:t>
+            </a:r>
+            <a:r>
               <a:rPr kumimoji="1" lang="en-US" altLang="ko-KR" sz="1566">
                 <a:solidFill>
                   <a:schemeClr val="tx1"/>
                 </a:solidFill>
               </a:rPr>
-              <a:t>1 . Business Calendar (02</a:t>
+              <a:t>(</a:t>
             </a:r>
             <a:r>
-              <a:rPr kumimoji="1" lang="ko-KR" altLang="en-US" sz="1566">
+              <a:rPr kumimoji="1" lang="en-US" altLang="ko-KR" sz="1566" smtClean="0">
+                <a:solidFill>
+                  <a:schemeClr val="tx1"/>
+                </a:solidFill>
+              </a:rPr>
+              <a:t>03</a:t>
+            </a:r>
+            <a:r>
+              <a:rPr kumimoji="1" lang="ko-KR" altLang="en-US" sz="1566" smtClean="0">
                 <a:solidFill>
                   <a:schemeClr val="tx1"/>
                 </a:solidFill>
@@ -3729,14 +3760,14 @@
               <a:t>월</a:t>
             </a:r>
             <a:r>
-              <a:rPr kumimoji="1" lang="en-US" altLang="ko-KR" sz="1566">
+              <a:rPr kumimoji="1" lang="en-US" altLang="ko-KR" sz="1566" dirty="0">
                 <a:solidFill>
                   <a:schemeClr val="tx1"/>
                 </a:solidFill>
               </a:rPr>
               <a:t>)</a:t>
             </a:r>
-            <a:endParaRPr kumimoji="1" lang="ko-KR" altLang="en-US" sz="1566">
+            <a:endParaRPr kumimoji="1" lang="ko-KR" altLang="en-US" sz="1566" dirty="0">
               <a:solidFill>
                 <a:schemeClr val="tx1"/>
               </a:solidFill>
@@ -3754,24 +3785,67 @@
         </p:nvGraphicFramePr>
         <p:xfrm>
           <a:off x="373635" y="1192132"/>
-          <a:ext cx="9121451" cy="5001176"/>
+          <a:ext cx="9121451" cy="5001716"/>
         </p:xfrm>
         <a:graphic>
           <a:graphicData uri="http://schemas.openxmlformats.org/drawingml/2006/table">
             <a:tbl>
+              <a:tblPr/>
               <a:tblGrid>
-                <a:gridCol w="1292413"/>
-                <a:gridCol w="1292413"/>
-                <a:gridCol w="1292413"/>
-                <a:gridCol w="1298626"/>
-                <a:gridCol w="1335907"/>
-                <a:gridCol w="1342121"/>
-                <a:gridCol w="1267558"/>
+                <a:gridCol w="1292413">
+                  <a:extLst>
+                    <a:ext uri="{9D8B030D-6E8A-4147-A177-3AD203B41FA5}">
+                      <a16:colId xmlns:a16="http://schemas.microsoft.com/office/drawing/2014/main" val="20000"/>
+                    </a:ext>
+                  </a:extLst>
+                </a:gridCol>
+                <a:gridCol w="1292413">
+                  <a:extLst>
+                    <a:ext uri="{9D8B030D-6E8A-4147-A177-3AD203B41FA5}">
+                      <a16:colId xmlns:a16="http://schemas.microsoft.com/office/drawing/2014/main" val="20001"/>
+                    </a:ext>
+                  </a:extLst>
+                </a:gridCol>
+                <a:gridCol w="1292413">
+                  <a:extLst>
+                    <a:ext uri="{9D8B030D-6E8A-4147-A177-3AD203B41FA5}">
+                      <a16:colId xmlns:a16="http://schemas.microsoft.com/office/drawing/2014/main" val="20002"/>
+                    </a:ext>
+                  </a:extLst>
+                </a:gridCol>
+                <a:gridCol w="1298626">
+                  <a:extLst>
+                    <a:ext uri="{9D8B030D-6E8A-4147-A177-3AD203B41FA5}">
+                      <a16:colId xmlns:a16="http://schemas.microsoft.com/office/drawing/2014/main" val="20003"/>
+                    </a:ext>
+                  </a:extLst>
+                </a:gridCol>
+                <a:gridCol w="1335907">
+                  <a:extLst>
+                    <a:ext uri="{9D8B030D-6E8A-4147-A177-3AD203B41FA5}">
+                      <a16:colId xmlns:a16="http://schemas.microsoft.com/office/drawing/2014/main" val="20004"/>
+                    </a:ext>
+                  </a:extLst>
+                </a:gridCol>
+                <a:gridCol w="1342121">
+                  <a:extLst>
+                    <a:ext uri="{9D8B030D-6E8A-4147-A177-3AD203B41FA5}">
+                      <a16:colId xmlns:a16="http://schemas.microsoft.com/office/drawing/2014/main" val="20005"/>
+                    </a:ext>
+                  </a:extLst>
+                </a:gridCol>
+                <a:gridCol w="1267558">
+                  <a:extLst>
+                    <a:ext uri="{9D8B030D-6E8A-4147-A177-3AD203B41FA5}">
+                      <a16:colId xmlns:a16="http://schemas.microsoft.com/office/drawing/2014/main" val="20006"/>
+                    </a:ext>
+                  </a:extLst>
+                </a:gridCol>
               </a:tblGrid>
               <a:tr h="226092">
                 <a:tc>
                   <a:txBody>
-                    <a:bodyPr vert="horz" lIns="89475" tIns="44735" rIns="89475" bIns="44735" anchor="ctr" anchorCtr="0"/>
+                    <a:bodyPr/>
                     <a:lstStyle>
                       <a:lvl1pPr>
                         <a:defRPr kumimoji="1" sz="1200">
@@ -3919,7 +3993,7 @@
                       <a:r>
                         <a:rPr kumimoji="0" lang="ko-KR" altLang="en-US" sz="900" b="0" i="0" u="none" strike="noStrike" cap="none" normalizeH="0" baseline="0">
                           <a:solidFill>
-                            <a:srgbClr val="ff0000"/>
+                            <a:srgbClr val="FF0000"/>
                           </a:solidFill>
                           <a:effectLst/>
                           <a:latin typeface="맑은 고딕"/>
@@ -3975,13 +4049,13 @@
                       <a:noFill/>
                     </a:lnBlToTr>
                     <a:solidFill>
-                      <a:srgbClr val="eaeaea"/>
+                      <a:srgbClr val="EAEAEA"/>
                     </a:solidFill>
                   </a:tcPr>
                 </a:tc>
                 <a:tc>
                   <a:txBody>
-                    <a:bodyPr vert="horz" lIns="89475" tIns="44735" rIns="89475" bIns="44735" anchor="ctr" anchorCtr="0"/>
+                    <a:bodyPr/>
                     <a:lstStyle>
                       <a:lvl1pPr>
                         <a:defRPr kumimoji="1" sz="1200">
@@ -4184,13 +4258,13 @@
                       <a:noFill/>
                     </a:lnBlToTr>
                     <a:solidFill>
-                      <a:srgbClr val="eaeaea"/>
+                      <a:srgbClr val="EAEAEA"/>
                     </a:solidFill>
                   </a:tcPr>
                 </a:tc>
                 <a:tc>
                   <a:txBody>
-                    <a:bodyPr vert="horz" lIns="89475" tIns="44735" rIns="89475" bIns="44735" anchor="ctr" anchorCtr="0"/>
+                    <a:bodyPr/>
                     <a:lstStyle>
                       <a:lvl1pPr>
                         <a:defRPr kumimoji="1" sz="1200">
@@ -4393,13 +4467,13 @@
                       <a:noFill/>
                     </a:lnBlToTr>
                     <a:solidFill>
-                      <a:srgbClr val="eaeaea"/>
+                      <a:srgbClr val="EAEAEA"/>
                     </a:solidFill>
                   </a:tcPr>
                 </a:tc>
                 <a:tc>
                   <a:txBody>
-                    <a:bodyPr vert="horz" lIns="89475" tIns="44735" rIns="89475" bIns="44735" anchor="ctr" anchorCtr="0"/>
+                    <a:bodyPr/>
                     <a:lstStyle>
                       <a:lvl1pPr>
                         <a:defRPr kumimoji="1" sz="1200">
@@ -4602,13 +4676,13 @@
                       <a:noFill/>
                     </a:lnBlToTr>
                     <a:solidFill>
-                      <a:srgbClr val="eaeaea"/>
+                      <a:srgbClr val="EAEAEA"/>
                     </a:solidFill>
                   </a:tcPr>
                 </a:tc>
                 <a:tc>
                   <a:txBody>
-                    <a:bodyPr vert="horz" lIns="89475" tIns="44735" rIns="89475" bIns="44735" anchor="ctr" anchorCtr="0"/>
+                    <a:bodyPr/>
                     <a:lstStyle>
                       <a:lvl1pPr>
                         <a:defRPr kumimoji="1" sz="1200">
@@ -4811,13 +4885,13 @@
                       <a:noFill/>
                     </a:lnBlToTr>
                     <a:solidFill>
-                      <a:srgbClr val="eaeaea"/>
+                      <a:srgbClr val="EAEAEA"/>
                     </a:solidFill>
                   </a:tcPr>
                 </a:tc>
                 <a:tc>
                   <a:txBody>
-                    <a:bodyPr vert="horz" lIns="89475" tIns="44735" rIns="89475" bIns="44735" anchor="ctr" anchorCtr="0"/>
+                    <a:bodyPr/>
                     <a:lstStyle>
                       <a:lvl1pPr>
                         <a:defRPr kumimoji="1" sz="1200">
@@ -5020,13 +5094,13 @@
                       <a:noFill/>
                     </a:lnBlToTr>
                     <a:solidFill>
-                      <a:srgbClr val="eaeaea"/>
+                      <a:srgbClr val="EAEAEA"/>
                     </a:solidFill>
                   </a:tcPr>
                 </a:tc>
                 <a:tc>
                   <a:txBody>
-                    <a:bodyPr vert="horz" lIns="89475" tIns="44735" rIns="89475" bIns="44735" anchor="ctr" anchorCtr="0"/>
+                    <a:bodyPr/>
                     <a:lstStyle>
                       <a:lvl1pPr>
                         <a:defRPr kumimoji="1" sz="1200">
@@ -5174,7 +5248,7 @@
                       <a:r>
                         <a:rPr kumimoji="0" lang="ko-KR" altLang="en-US" sz="900" b="0" i="0" u="none" strike="noStrike" cap="none" normalizeH="0" baseline="0">
                           <a:solidFill>
-                            <a:srgbClr val="0000ff"/>
+                            <a:srgbClr val="0000FF"/>
                           </a:solidFill>
                           <a:effectLst/>
                           <a:latin typeface="맑은 고딕"/>
@@ -5230,15 +5304,20 @@
                       <a:noFill/>
                     </a:lnBlToTr>
                     <a:solidFill>
-                      <a:srgbClr val="eaeaea"/>
+                      <a:srgbClr val="EAEAEA"/>
                     </a:solidFill>
                   </a:tcPr>
                 </a:tc>
+                <a:extLst>
+                  <a:ext uri="{0D108BD9-81ED-4DB2-BD59-A6C34878D82A}">
+                    <a16:rowId xmlns:a16="http://schemas.microsoft.com/office/drawing/2014/main" val="10000"/>
+                  </a:ext>
+                </a:extLst>
               </a:tr>
               <a:tr h="950733">
                 <a:tc>
                   <a:txBody>
-                    <a:bodyPr vert="horz" lIns="89475" tIns="44735" rIns="89475" bIns="44735" anchor="t" anchorCtr="0"/>
+                    <a:bodyPr/>
                     <a:lstStyle>
                       <a:lvl1pPr>
                         <a:defRPr kumimoji="1" sz="1200">
@@ -5385,7 +5464,7 @@
                       </a:pPr>
                       <a:endParaRPr kumimoji="0" lang="en-US" altLang="ko-KR" sz="900" b="0" i="0" u="none" strike="noStrike" cap="none" normalizeH="0" baseline="0">
                         <a:solidFill>
-                          <a:srgbClr val="ff0000"/>
+                          <a:srgbClr val="FF0000"/>
                         </a:solidFill>
                         <a:effectLst/>
                         <a:latin typeface="맑은 고딕"/>
@@ -5434,7 +5513,7 @@
                 </a:tc>
                 <a:tc>
                   <a:txBody>
-                    <a:bodyPr vert="horz" lIns="89475" tIns="44735" rIns="89475" bIns="44735" anchor="t" anchorCtr="0"/>
+                    <a:bodyPr/>
                     <a:lstStyle>
                       <a:lvl1pPr>
                         <a:defRPr kumimoji="1" sz="1200">
@@ -5630,7 +5709,7 @@
                 </a:tc>
                 <a:tc>
                   <a:txBody>
-                    <a:bodyPr vert="horz" lIns="89475" tIns="44735" rIns="89475" bIns="44735" anchor="t" anchorCtr="0"/>
+                    <a:bodyPr/>
                     <a:lstStyle>
                       <a:lvl1pPr>
                         <a:defRPr kumimoji="1" sz="1200">
@@ -5826,7 +5905,7 @@
                 </a:tc>
                 <a:tc>
                   <a:txBody>
-                    <a:bodyPr vert="horz" lIns="89475" tIns="44735" rIns="89475" bIns="44735" anchor="t" anchorCtr="0"/>
+                    <a:bodyPr/>
                     <a:lstStyle>
                       <a:lvl1pPr defTabSz="957263">
                         <a:defRPr kumimoji="1" sz="1200">
@@ -5974,7 +6053,7 @@
                       <a:r>
                         <a:rPr kumimoji="0" lang="en-US" altLang="ko-KR" sz="900" b="0" i="0" u="none" strike="noStrike" cap="none" normalizeH="0" baseline="0">
                           <a:solidFill>
-                            <a:srgbClr val="ff0000"/>
+                            <a:srgbClr val="FF0000"/>
                           </a:solidFill>
                           <a:effectLst/>
                           <a:latin typeface="맑은 고딕"/>
@@ -5983,9 +6062,26 @@
                         </a:rPr>
                         <a:t>1</a:t>
                       </a:r>
+                    </a:p>
+                    <a:p>
+                      <a:pPr marL="0" marR="0" lvl="0" indent="0" algn="l" defTabSz="957263" rtl="0" eaLnBrk="1" latinLnBrk="0" hangingPunct="1">
+                        <a:lnSpc>
+                          <a:spcPct val="100000"/>
+                        </a:lnSpc>
+                        <a:spcBef>
+                          <a:spcPct val="0"/>
+                        </a:spcBef>
+                        <a:spcAft>
+                          <a:spcPct val="0"/>
+                        </a:spcAft>
+                        <a:buClrTx/>
+                        <a:buFontTx/>
+                        <a:buNone/>
+                        <a:defRPr/>
+                      </a:pPr>
                       <a:endParaRPr kumimoji="0" lang="en-US" altLang="ko-KR" sz="900" b="0" i="0" u="none" strike="noStrike" cap="none" normalizeH="0" baseline="0">
                         <a:solidFill>
-                          <a:srgbClr val="ff0000"/>
+                          <a:srgbClr val="FF0000"/>
                         </a:solidFill>
                         <a:effectLst/>
                         <a:latin typeface="맑은 고딕"/>
@@ -6009,36 +6105,10 @@
                         <a:buNone/>
                         <a:defRPr/>
                       </a:pPr>
-                      <a:endParaRPr kumimoji="0" lang="en-US" altLang="ko-KR" sz="900" b="0" i="0" u="none" strike="noStrike" cap="none" normalizeH="0" baseline="0">
-                        <a:solidFill>
-                          <a:srgbClr val="ff0000"/>
-                        </a:solidFill>
-                        <a:effectLst/>
-                        <a:latin typeface="맑은 고딕"/>
-                        <a:ea typeface="맑은 고딕"/>
-                        <a:cs typeface="+mn-cs"/>
-                      </a:endParaRPr>
-                    </a:p>
-                    <a:p>
-                      <a:pPr marL="0" marR="0" lvl="0" indent="0" algn="l" defTabSz="957263" rtl="0" eaLnBrk="1" latinLnBrk="0" hangingPunct="1">
-                        <a:lnSpc>
-                          <a:spcPct val="100000"/>
-                        </a:lnSpc>
-                        <a:spcBef>
-                          <a:spcPct val="0"/>
-                        </a:spcBef>
-                        <a:spcAft>
-                          <a:spcPct val="0"/>
-                        </a:spcAft>
-                        <a:buClrTx/>
-                        <a:buFontTx/>
-                        <a:buNone/>
-                        <a:defRPr/>
-                      </a:pPr>
                       <a:r>
                         <a:rPr kumimoji="0" lang="ko-KR" altLang="en-US" sz="900" b="0" i="0" u="none" strike="noStrike" cap="none" normalizeH="0" baseline="0">
                           <a:solidFill>
-                            <a:srgbClr val="ff0000"/>
+                            <a:srgbClr val="FF0000"/>
                           </a:solidFill>
                           <a:effectLst/>
                           <a:latin typeface="맑은 고딕"/>
@@ -6047,15 +6117,6 @@
                         </a:rPr>
                         <a:t>삼일절 </a:t>
                       </a:r>
-                      <a:endParaRPr kumimoji="0" lang="ko-KR" altLang="en-US" sz="900" b="0" i="0" u="none" strike="noStrike" cap="none" normalizeH="0" baseline="0">
-                        <a:solidFill>
-                          <a:srgbClr val="ff0000"/>
-                        </a:solidFill>
-                        <a:effectLst/>
-                        <a:latin typeface="맑은 고딕"/>
-                        <a:ea typeface="맑은 고딕"/>
-                        <a:cs typeface="+mn-cs"/>
-                      </a:endParaRPr>
                     </a:p>
                   </a:txBody>
                   <a:tcPr marL="89475" marR="89475" marT="44736" marB="44736" horzOverflow="overflow">
@@ -6098,7 +6159,7 @@
                 </a:tc>
                 <a:tc>
                   <a:txBody>
-                    <a:bodyPr vert="horz" lIns="89475" tIns="44735" rIns="89475" bIns="44735" anchor="t" anchorCtr="0"/>
+                    <a:bodyPr/>
                     <a:lstStyle>
                       <a:lvl1pPr defTabSz="957263">
                         <a:defRPr kumimoji="1" sz="1200">
@@ -6255,15 +6316,6 @@
                         </a:rPr>
                         <a:t>2</a:t>
                       </a:r>
-                      <a:endParaRPr kumimoji="0" lang="en-US" altLang="ko-KR" sz="900" b="0" i="0" u="none" strike="noStrike" cap="none" normalizeH="0" baseline="0">
-                        <a:solidFill>
-                          <a:schemeClr val="tx1"/>
-                        </a:solidFill>
-                        <a:effectLst/>
-                        <a:latin typeface="맑은 고딕"/>
-                        <a:ea typeface="맑은 고딕"/>
-                        <a:cs typeface="+mn-cs"/>
-                      </a:endParaRPr>
                     </a:p>
                   </a:txBody>
                   <a:tcPr marL="89475" marR="89475" marT="44736" marB="44736" horzOverflow="overflow">
@@ -6306,7 +6358,7 @@
                 </a:tc>
                 <a:tc>
                   <a:txBody>
-                    <a:bodyPr vert="horz" lIns="89475" tIns="44732" rIns="89475" bIns="44732" anchor="t" anchorCtr="0"/>
+                    <a:bodyPr/>
                     <a:lstStyle>
                       <a:lvl1pPr defTabSz="957263">
                         <a:defRPr kumimoji="1" sz="1200">
@@ -6463,15 +6515,6 @@
                         </a:rPr>
                         <a:t>3</a:t>
                       </a:r>
-                      <a:endParaRPr kumimoji="0" lang="en-US" altLang="ko-KR" sz="900" b="0" i="0" u="none" strike="noStrike" cap="none" normalizeH="0" baseline="0">
-                        <a:solidFill>
-                          <a:schemeClr val="tx1"/>
-                        </a:solidFill>
-                        <a:effectLst/>
-                        <a:latin typeface="맑은 고딕"/>
-                        <a:ea typeface="맑은 고딕"/>
-                        <a:cs typeface="+mn-cs"/>
-                      </a:endParaRPr>
                     </a:p>
                   </a:txBody>
                   <a:tcPr marL="89475" marR="89475" marT="44732" marB="44732" horzOverflow="overflow">
@@ -6514,7 +6557,7 @@
                 </a:tc>
                 <a:tc>
                   <a:txBody>
-                    <a:bodyPr vert="horz" lIns="89475" tIns="44735" rIns="89475" bIns="44735" anchor="t" anchorCtr="0"/>
+                    <a:bodyPr/>
                     <a:lstStyle>
                       <a:lvl1pPr>
                         <a:defRPr kumimoji="1" sz="1200">
@@ -6662,7 +6705,7 @@
                       <a:r>
                         <a:rPr kumimoji="0" lang="en-US" altLang="ko-KR" sz="900" b="0" i="0" u="none" strike="noStrike" cap="none" normalizeH="0" baseline="0">
                           <a:solidFill>
-                            <a:srgbClr val="0000cc"/>
+                            <a:srgbClr val="0000CC"/>
                           </a:solidFill>
                           <a:effectLst/>
                           <a:latin typeface="맑은 고딕"/>
@@ -6671,15 +6714,6 @@
                         </a:rPr>
                         <a:t>4</a:t>
                       </a:r>
-                      <a:endParaRPr kumimoji="0" lang="en-US" altLang="ko-KR" sz="900" b="0" i="0" u="none" strike="noStrike" cap="none" normalizeH="0" baseline="0">
-                        <a:solidFill>
-                          <a:srgbClr val="0000cc"/>
-                        </a:solidFill>
-                        <a:effectLst/>
-                        <a:latin typeface="맑은 고딕"/>
-                        <a:ea typeface="맑은 고딕"/>
-                        <a:cs typeface="+mn-cs"/>
-                      </a:endParaRPr>
                     </a:p>
                   </a:txBody>
                   <a:tcPr marL="89475" marR="89475" marT="44736" marB="44736" horzOverflow="overflow">
@@ -6720,11 +6754,16 @@
                     <a:noFill/>
                   </a:tcPr>
                 </a:tc>
+                <a:extLst>
+                  <a:ext uri="{0D108BD9-81ED-4DB2-BD59-A6C34878D82A}">
+                    <a16:rowId xmlns:a16="http://schemas.microsoft.com/office/drawing/2014/main" val="10001"/>
+                  </a:ext>
+                </a:extLst>
               </a:tr>
               <a:tr h="928984">
                 <a:tc>
                   <a:txBody>
-                    <a:bodyPr vert="horz" lIns="89475" tIns="44735" rIns="89475" bIns="44735" anchor="t" anchorCtr="0"/>
+                    <a:bodyPr/>
                     <a:lstStyle>
                       <a:lvl1pPr>
                         <a:defRPr kumimoji="1" sz="1200">
@@ -6872,7 +6911,7 @@
                       <a:r>
                         <a:rPr kumimoji="0" lang="en-US" altLang="ko-KR" sz="900" b="0" i="0" u="none" strike="noStrike" cap="none" normalizeH="0" baseline="0">
                           <a:solidFill>
-                            <a:srgbClr val="ff0000"/>
+                            <a:srgbClr val="FF0000"/>
                           </a:solidFill>
                           <a:effectLst/>
                           <a:latin typeface="맑은 고딕"/>
@@ -6881,15 +6920,6 @@
                         </a:rPr>
                         <a:t>5</a:t>
                       </a:r>
-                      <a:endParaRPr kumimoji="0" lang="en-US" altLang="ko-KR" sz="900" b="0" i="0" u="none" strike="noStrike" cap="none" normalizeH="0" baseline="0">
-                        <a:solidFill>
-                          <a:srgbClr val="ff0000"/>
-                        </a:solidFill>
-                        <a:effectLst/>
-                        <a:latin typeface="맑은 고딕"/>
-                        <a:ea typeface="맑은 고딕"/>
-                        <a:cs typeface="+mn-cs"/>
-                      </a:endParaRPr>
                     </a:p>
                   </a:txBody>
                   <a:tcPr marL="89475" marR="89475" marT="44736" marB="44736" horzOverflow="overflow">
@@ -6932,7 +6962,7 @@
                 </a:tc>
                 <a:tc>
                   <a:txBody>
-                    <a:bodyPr vert="horz" lIns="89475" tIns="44735" rIns="89475" bIns="44735" anchor="t" anchorCtr="0"/>
+                    <a:bodyPr/>
                     <a:lstStyle>
                       <a:lvl1pPr defTabSz="957263">
                         <a:defRPr kumimoji="1" sz="1200">
@@ -7090,15 +7120,6 @@
                         </a:rPr>
                         <a:t>6</a:t>
                       </a:r>
-                      <a:endParaRPr kumimoji="0" lang="en-US" altLang="ko-KR" sz="900" b="0" i="0" u="none" strike="noStrike" cap="none" normalizeH="0" baseline="0">
-                        <a:solidFill>
-                          <a:schemeClr val="tx1"/>
-                        </a:solidFill>
-                        <a:effectLst/>
-                        <a:latin typeface="맑은 고딕"/>
-                        <a:ea typeface="맑은 고딕"/>
-                        <a:cs typeface="+mn-cs"/>
-                      </a:endParaRPr>
                     </a:p>
                   </a:txBody>
                   <a:tcPr marL="89475" marR="89475" marT="44736" marB="44736" horzOverflow="overflow">
@@ -7141,7 +7162,7 @@
                 </a:tc>
                 <a:tc>
                   <a:txBody>
-                    <a:bodyPr vert="horz" lIns="89475" tIns="44735" rIns="89475" bIns="44735" anchor="t" anchorCtr="0"/>
+                    <a:bodyPr/>
                     <a:lstStyle>
                       <a:lvl1pPr defTabSz="957263">
                         <a:defRPr kumimoji="1" sz="1200">
@@ -7298,15 +7319,6 @@
                         </a:rPr>
                         <a:t>7</a:t>
                       </a:r>
-                      <a:endParaRPr kumimoji="0" lang="en-US" altLang="ko-KR" sz="900" b="0" i="0" u="none" strike="noStrike" cap="none" normalizeH="0" baseline="0">
-                        <a:solidFill>
-                          <a:schemeClr val="tx1"/>
-                        </a:solidFill>
-                        <a:effectLst/>
-                        <a:latin typeface="맑은 고딕"/>
-                        <a:ea typeface="맑은 고딕"/>
-                        <a:cs typeface="+mn-cs"/>
-                      </a:endParaRPr>
                     </a:p>
                   </a:txBody>
                   <a:tcPr marL="89475" marR="89475" marT="44736" marB="44736" horzOverflow="overflow">
@@ -7349,7 +7361,7 @@
                 </a:tc>
                 <a:tc>
                   <a:txBody>
-                    <a:bodyPr vert="horz" lIns="89475" tIns="44735" rIns="89475" bIns="44735" anchor="t" anchorCtr="0"/>
+                    <a:bodyPr/>
                     <a:lstStyle>
                       <a:lvl1pPr defTabSz="957263">
                         <a:defRPr kumimoji="1" sz="1200">
@@ -7506,15 +7518,6 @@
                         </a:rPr>
                         <a:t>8</a:t>
                       </a:r>
-                      <a:endParaRPr kumimoji="0" lang="en-US" altLang="ko-KR" sz="900" b="0" i="0" u="none" strike="noStrike" cap="none" normalizeH="0" baseline="0">
-                        <a:solidFill>
-                          <a:schemeClr val="tx1"/>
-                        </a:solidFill>
-                        <a:effectLst/>
-                        <a:latin typeface="맑은 고딕"/>
-                        <a:ea typeface="맑은 고딕"/>
-                        <a:cs typeface="+mn-cs"/>
-                      </a:endParaRPr>
                     </a:p>
                   </a:txBody>
                   <a:tcPr marL="89475" marR="89475" marT="44736" marB="44736" horzOverflow="overflow">
@@ -7557,7 +7560,7 @@
                 </a:tc>
                 <a:tc>
                   <a:txBody>
-                    <a:bodyPr vert="horz" lIns="89475" tIns="44735" rIns="89475" bIns="44735" anchor="t" anchorCtr="0"/>
+                    <a:bodyPr/>
                     <a:lstStyle>
                       <a:lvl1pPr defTabSz="957263">
                         <a:defRPr kumimoji="1" sz="1200">
@@ -7714,15 +7717,6 @@
                         </a:rPr>
                         <a:t>9</a:t>
                       </a:r>
-                      <a:endParaRPr kumimoji="0" lang="en-US" altLang="ko-KR" sz="900" b="0" i="0" u="none" strike="noStrike" cap="none" normalizeH="0" baseline="0">
-                        <a:solidFill>
-                          <a:schemeClr val="tx1"/>
-                        </a:solidFill>
-                        <a:effectLst/>
-                        <a:latin typeface="맑은 고딕"/>
-                        <a:ea typeface="맑은 고딕"/>
-                        <a:cs typeface="+mn-cs"/>
-                      </a:endParaRPr>
                     </a:p>
                   </a:txBody>
                   <a:tcPr marL="89475" marR="89475" marT="44736" marB="44736" horzOverflow="overflow">
@@ -7765,7 +7759,7 @@
                 </a:tc>
                 <a:tc>
                   <a:txBody>
-                    <a:bodyPr vert="horz" lIns="89475" tIns="44735" rIns="89475" bIns="44735" anchor="t" anchorCtr="0"/>
+                    <a:bodyPr/>
                     <a:lstStyle>
                       <a:lvl1pPr defTabSz="957263">
                         <a:defRPr kumimoji="1" sz="1200">
@@ -7922,15 +7916,6 @@
                         </a:rPr>
                         <a:t>10</a:t>
                       </a:r>
-                      <a:endParaRPr kumimoji="0" lang="en-US" altLang="ko-KR" sz="900" b="0" i="0" u="none" strike="noStrike" cap="none" normalizeH="0" baseline="0">
-                        <a:solidFill>
-                          <a:schemeClr val="tx1"/>
-                        </a:solidFill>
-                        <a:effectLst/>
-                        <a:latin typeface="맑은 고딕"/>
-                        <a:ea typeface="맑은 고딕"/>
-                        <a:cs typeface="+mn-cs"/>
-                      </a:endParaRPr>
                     </a:p>
                   </a:txBody>
                   <a:tcPr marL="89475" marR="89475" marT="44736" marB="44736" horzOverflow="overflow">
@@ -7973,7 +7958,7 @@
                 </a:tc>
                 <a:tc>
                   <a:txBody>
-                    <a:bodyPr vert="horz" lIns="89475" tIns="44735" rIns="89475" bIns="44735" anchor="t" anchorCtr="0"/>
+                    <a:bodyPr/>
                     <a:lstStyle>
                       <a:lvl1pPr>
                         <a:defRPr kumimoji="1" sz="1200">
@@ -8121,7 +8106,7 @@
                       <a:r>
                         <a:rPr kumimoji="0" lang="en-US" altLang="ko-KR" sz="900" b="0" i="0" u="none" strike="noStrike" cap="none" normalizeH="0" baseline="0">
                           <a:solidFill>
-                            <a:srgbClr val="0000cc"/>
+                            <a:srgbClr val="0000CC"/>
                           </a:solidFill>
                           <a:effectLst/>
                           <a:latin typeface="맑은 고딕"/>
@@ -8130,15 +8115,6 @@
                         </a:rPr>
                         <a:t>11</a:t>
                       </a:r>
-                      <a:endParaRPr kumimoji="0" lang="en-US" altLang="ko-KR" sz="900" b="0" i="0" u="none" strike="noStrike" cap="none" normalizeH="0" baseline="0">
-                        <a:solidFill>
-                          <a:srgbClr val="0000cc"/>
-                        </a:solidFill>
-                        <a:effectLst/>
-                        <a:latin typeface="맑은 고딕"/>
-                        <a:ea typeface="맑은 고딕"/>
-                        <a:cs typeface="+mn-cs"/>
-                      </a:endParaRPr>
                     </a:p>
                   </a:txBody>
                   <a:tcPr marL="89475" marR="89475" marT="44736" marB="44736" horzOverflow="overflow">
@@ -8179,11 +8155,16 @@
                     <a:noFill/>
                   </a:tcPr>
                 </a:tc>
+                <a:extLst>
+                  <a:ext uri="{0D108BD9-81ED-4DB2-BD59-A6C34878D82A}">
+                    <a16:rowId xmlns:a16="http://schemas.microsoft.com/office/drawing/2014/main" val="10002"/>
+                  </a:ext>
+                </a:extLst>
               </a:tr>
               <a:tr h="1029019">
                 <a:tc>
                   <a:txBody>
-                    <a:bodyPr vert="horz" lIns="89475" tIns="44720" rIns="89475" bIns="44720" anchor="t" anchorCtr="0"/>
+                    <a:bodyPr/>
                     <a:lstStyle>
                       <a:lvl1pPr>
                         <a:defRPr kumimoji="1" sz="1200">
@@ -8331,7 +8312,7 @@
                       <a:r>
                         <a:rPr kumimoji="0" lang="en-US" altLang="ko-KR" sz="900" b="0" i="0" u="none" strike="noStrike" cap="none" normalizeH="0" baseline="0">
                           <a:solidFill>
-                            <a:srgbClr val="ff0000"/>
+                            <a:srgbClr val="FF0000"/>
                           </a:solidFill>
                           <a:effectLst/>
                           <a:latin typeface="맑은 고딕"/>
@@ -8340,15 +8321,6 @@
                         </a:rPr>
                         <a:t>12</a:t>
                       </a:r>
-                      <a:endParaRPr kumimoji="0" lang="en-US" altLang="ko-KR" sz="900" b="0" i="0" u="none" strike="noStrike" cap="none" normalizeH="0" baseline="0">
-                        <a:solidFill>
-                          <a:srgbClr val="ff0000"/>
-                        </a:solidFill>
-                        <a:effectLst/>
-                        <a:latin typeface="맑은 고딕"/>
-                        <a:ea typeface="맑은 고딕"/>
-                        <a:cs typeface="+mn-cs"/>
-                      </a:endParaRPr>
                     </a:p>
                   </a:txBody>
                   <a:tcPr marL="89475" marR="89475" marT="44720" marB="44720" horzOverflow="overflow">
@@ -8391,7 +8363,7 @@
                 </a:tc>
                 <a:tc>
                   <a:txBody>
-                    <a:bodyPr vert="horz" lIns="89475" tIns="44720" rIns="89475" bIns="44720" anchor="t" anchorCtr="0"/>
+                    <a:bodyPr/>
                     <a:lstStyle>
                       <a:lvl1pPr defTabSz="957263">
                         <a:defRPr kumimoji="1" sz="1200">
@@ -8548,15 +8520,6 @@
                         </a:rPr>
                         <a:t>13</a:t>
                       </a:r>
-                      <a:endParaRPr kumimoji="0" lang="en-US" altLang="ko-KR" sz="900" b="0" i="0" u="none" strike="noStrike" cap="none" normalizeH="0" baseline="0">
-                        <a:solidFill>
-                          <a:schemeClr val="tx1"/>
-                        </a:solidFill>
-                        <a:effectLst/>
-                        <a:latin typeface="맑은 고딕"/>
-                        <a:ea typeface="맑은 고딕"/>
-                        <a:cs typeface="+mn-cs"/>
-                      </a:endParaRPr>
                     </a:p>
                   </a:txBody>
                   <a:tcPr marL="89475" marR="89475" marT="44720" marB="44720" horzOverflow="overflow">
@@ -8599,7 +8562,7 @@
                 </a:tc>
                 <a:tc>
                   <a:txBody>
-                    <a:bodyPr vert="horz" lIns="89475" tIns="44720" rIns="89475" bIns="44720" anchor="t" anchorCtr="0"/>
+                    <a:bodyPr/>
                     <a:lstStyle>
                       <a:lvl1pPr defTabSz="957263">
                         <a:defRPr kumimoji="1" sz="1200">
@@ -8756,15 +8719,6 @@
                         </a:rPr>
                         <a:t>14</a:t>
                       </a:r>
-                      <a:endParaRPr kumimoji="0" lang="en-US" altLang="ko-KR" sz="900" b="0" i="0" u="none" strike="noStrike" cap="none" normalizeH="0" baseline="0">
-                        <a:solidFill>
-                          <a:schemeClr val="tx1"/>
-                        </a:solidFill>
-                        <a:effectLst/>
-                        <a:latin typeface="맑은 고딕"/>
-                        <a:ea typeface="맑은 고딕"/>
-                        <a:cs typeface="+mn-cs"/>
-                      </a:endParaRPr>
                     </a:p>
                   </a:txBody>
                   <a:tcPr marL="89475" marR="89475" marT="44720" marB="44720" horzOverflow="overflow">
@@ -8807,7 +8761,7 @@
                 </a:tc>
                 <a:tc>
                   <a:txBody>
-                    <a:bodyPr vert="horz" lIns="89475" tIns="44735" rIns="89475" bIns="44735" anchor="t" anchorCtr="0"/>
+                    <a:bodyPr/>
                     <a:lstStyle>
                       <a:lvl1pPr defTabSz="957263">
                         <a:defRPr kumimoji="1" sz="1200">
@@ -8964,15 +8918,6 @@
                         </a:rPr>
                         <a:t>15</a:t>
                       </a:r>
-                      <a:endParaRPr kumimoji="0" lang="en-US" altLang="ko-KR" sz="900" b="0" i="0" u="none" strike="noStrike" cap="none" normalizeH="0" baseline="0">
-                        <a:solidFill>
-                          <a:schemeClr val="tx1"/>
-                        </a:solidFill>
-                        <a:effectLst/>
-                        <a:latin typeface="맑은 고딕"/>
-                        <a:ea typeface="맑은 고딕"/>
-                        <a:cs typeface="+mn-cs"/>
-                      </a:endParaRPr>
                     </a:p>
                   </a:txBody>
                   <a:tcPr marL="89475" marR="89475" marT="44736" marB="44736" horzOverflow="overflow">
@@ -9015,7 +8960,7 @@
                 </a:tc>
                 <a:tc>
                   <a:txBody>
-                    <a:bodyPr vert="horz" lIns="89475" tIns="44735" rIns="89475" bIns="44735" anchor="t" anchorCtr="0"/>
+                    <a:bodyPr/>
                     <a:lstStyle>
                       <a:lvl1pPr>
                         <a:defRPr kumimoji="1" sz="1200">
@@ -9172,15 +9117,6 @@
                         </a:rPr>
                         <a:t>16</a:t>
                       </a:r>
-                      <a:endParaRPr kumimoji="0" lang="en-US" altLang="ko-KR" sz="900" b="0" i="0" u="none" strike="noStrike" cap="none" normalizeH="0" baseline="0">
-                        <a:solidFill>
-                          <a:schemeClr val="tx1"/>
-                        </a:solidFill>
-                        <a:effectLst/>
-                        <a:latin typeface="맑은 고딕"/>
-                        <a:ea typeface="맑은 고딕"/>
-                        <a:cs typeface="+mn-cs"/>
-                      </a:endParaRPr>
                     </a:p>
                   </a:txBody>
                   <a:tcPr marL="89475" marR="89475" marT="44736" marB="44736" horzOverflow="overflow">
@@ -9223,7 +9159,7 @@
                 </a:tc>
                 <a:tc>
                   <a:txBody>
-                    <a:bodyPr vert="horz" lIns="89475" tIns="44735" rIns="89475" bIns="44735" anchor="t" anchorCtr="0"/>
+                    <a:bodyPr/>
                     <a:lstStyle>
                       <a:lvl1pPr>
                         <a:defRPr kumimoji="1" sz="1200">
@@ -9380,15 +9316,6 @@
                         </a:rPr>
                         <a:t>17</a:t>
                       </a:r>
-                      <a:endParaRPr kumimoji="0" lang="en-US" altLang="ko-KR" sz="900" b="0" i="0" u="none" strike="noStrike" cap="none" normalizeH="0" baseline="0">
-                        <a:solidFill>
-                          <a:schemeClr val="tx1"/>
-                        </a:solidFill>
-                        <a:effectLst/>
-                        <a:latin typeface="맑은 고딕"/>
-                        <a:ea typeface="맑은 고딕"/>
-                        <a:cs typeface="+mn-cs"/>
-                      </a:endParaRPr>
                     </a:p>
                   </a:txBody>
                   <a:tcPr marL="89475" marR="89475" marT="44736" marB="44736" horzOverflow="overflow">
@@ -9431,7 +9358,7 @@
                 </a:tc>
                 <a:tc>
                   <a:txBody>
-                    <a:bodyPr vert="horz" lIns="89475" tIns="44735" rIns="89475" bIns="44735" anchor="t" anchorCtr="0"/>
+                    <a:bodyPr/>
                     <a:lstStyle>
                       <a:lvl1pPr>
                         <a:defRPr kumimoji="1" sz="1200">
@@ -9579,7 +9506,7 @@
                       <a:r>
                         <a:rPr kumimoji="0" lang="en-US" altLang="ko-KR" sz="900" b="0" i="0" u="none" strike="noStrike" cap="none" normalizeH="0" baseline="0">
                           <a:solidFill>
-                            <a:srgbClr val="0000cc"/>
+                            <a:srgbClr val="0000CC"/>
                           </a:solidFill>
                           <a:effectLst/>
                           <a:latin typeface="맑은 고딕"/>
@@ -9588,15 +9515,6 @@
                         </a:rPr>
                         <a:t>18</a:t>
                       </a:r>
-                      <a:endParaRPr kumimoji="0" lang="en-US" altLang="ko-KR" sz="900" b="0" i="0" u="none" strike="noStrike" cap="none" normalizeH="0" baseline="0">
-                        <a:solidFill>
-                          <a:srgbClr val="0000cc"/>
-                        </a:solidFill>
-                        <a:effectLst/>
-                        <a:latin typeface="맑은 고딕"/>
-                        <a:ea typeface="맑은 고딕"/>
-                        <a:cs typeface="+mn-cs"/>
-                      </a:endParaRPr>
                     </a:p>
                   </a:txBody>
                   <a:tcPr marL="89475" marR="89475" marT="44736" marB="44736" horzOverflow="overflow">
@@ -9637,11 +9555,16 @@
                     <a:noFill/>
                   </a:tcPr>
                 </a:tc>
+                <a:extLst>
+                  <a:ext uri="{0D108BD9-81ED-4DB2-BD59-A6C34878D82A}">
+                    <a16:rowId xmlns:a16="http://schemas.microsoft.com/office/drawing/2014/main" val="10003"/>
+                  </a:ext>
+                </a:extLst>
               </a:tr>
               <a:tr h="1029019">
                 <a:tc>
                   <a:txBody>
-                    <a:bodyPr vert="horz" lIns="89475" tIns="44720" rIns="89475" bIns="44720" anchor="t" anchorCtr="0"/>
+                    <a:bodyPr/>
                     <a:lstStyle>
                       <a:lvl1pPr>
                         <a:defRPr kumimoji="1" sz="1200">
@@ -9789,7 +9712,7 @@
                       <a:r>
                         <a:rPr kumimoji="0" lang="en-US" altLang="ko-KR" sz="900" b="0" i="0" u="none" strike="noStrike" cap="none" normalizeH="0" baseline="0">
                           <a:solidFill>
-                            <a:srgbClr val="ff0000"/>
+                            <a:srgbClr val="FF0000"/>
                           </a:solidFill>
                           <a:effectLst/>
                           <a:latin typeface="맑은 고딕"/>
@@ -9798,15 +9721,6 @@
                         </a:rPr>
                         <a:t>19</a:t>
                       </a:r>
-                      <a:endParaRPr kumimoji="0" lang="en-US" altLang="ko-KR" sz="900" b="0" i="0" u="none" strike="noStrike" cap="none" normalizeH="0" baseline="0">
-                        <a:solidFill>
-                          <a:srgbClr val="ff0000"/>
-                        </a:solidFill>
-                        <a:effectLst/>
-                        <a:latin typeface="맑은 고딕"/>
-                        <a:ea typeface="맑은 고딕"/>
-                        <a:cs typeface="+mn-cs"/>
-                      </a:endParaRPr>
                     </a:p>
                   </a:txBody>
                   <a:tcPr marL="89475" marR="89475" marT="44720" marB="44720" horzOverflow="overflow">
@@ -9849,7 +9763,7 @@
                 </a:tc>
                 <a:tc>
                   <a:txBody>
-                    <a:bodyPr vert="horz" lIns="89475" tIns="44720" rIns="89475" bIns="44720" anchor="t" anchorCtr="0"/>
+                    <a:bodyPr/>
                     <a:lstStyle>
                       <a:lvl1pPr defTabSz="957263">
                         <a:defRPr kumimoji="1" sz="1200">
@@ -10006,15 +9920,6 @@
                         </a:rPr>
                         <a:t>20</a:t>
                       </a:r>
-                      <a:endParaRPr kumimoji="0" lang="en-US" altLang="ko-KR" sz="900" b="0" i="0" u="none" strike="noStrike" cap="none" normalizeH="0" baseline="0">
-                        <a:solidFill>
-                          <a:schemeClr val="tx1"/>
-                        </a:solidFill>
-                        <a:effectLst/>
-                        <a:latin typeface="맑은 고딕"/>
-                        <a:ea typeface="맑은 고딕"/>
-                        <a:cs typeface="+mn-cs"/>
-                      </a:endParaRPr>
                     </a:p>
                   </a:txBody>
                   <a:tcPr marL="89475" marR="89475" marT="44720" marB="44720" horzOverflow="overflow">
@@ -10057,7 +9962,7 @@
                 </a:tc>
                 <a:tc>
                   <a:txBody>
-                    <a:bodyPr vert="horz" lIns="89475" tIns="44720" rIns="89475" bIns="44720" anchor="t" anchorCtr="0"/>
+                    <a:bodyPr/>
                     <a:lstStyle>
                       <a:lvl1pPr defTabSz="957263">
                         <a:defRPr kumimoji="1" sz="1200">
@@ -10214,15 +10119,6 @@
                         </a:rPr>
                         <a:t>21</a:t>
                       </a:r>
-                      <a:endParaRPr kumimoji="0" lang="en-US" altLang="ko-KR" sz="900" b="0" i="0" u="none" strike="noStrike" cap="none" normalizeH="0" baseline="0">
-                        <a:solidFill>
-                          <a:schemeClr val="tx1"/>
-                        </a:solidFill>
-                        <a:effectLst/>
-                        <a:latin typeface="맑은 고딕"/>
-                        <a:ea typeface="맑은 고딕"/>
-                        <a:cs typeface="+mn-cs"/>
-                      </a:endParaRPr>
                     </a:p>
                   </a:txBody>
                   <a:tcPr marL="89475" marR="89475" marT="44720" marB="44720" horzOverflow="overflow">
@@ -10265,7 +10161,7 @@
                 </a:tc>
                 <a:tc>
                   <a:txBody>
-                    <a:bodyPr vert="horz" lIns="89475" tIns="44735" rIns="89475" bIns="44735" anchor="t" anchorCtr="0"/>
+                    <a:bodyPr/>
                     <a:lstStyle>
                       <a:lvl1pPr defTabSz="957263">
                         <a:defRPr kumimoji="1" sz="1200">
@@ -10422,15 +10318,6 @@
                         </a:rPr>
                         <a:t>22</a:t>
                       </a:r>
-                      <a:endParaRPr kumimoji="0" lang="en-US" altLang="ko-KR" sz="900" b="0" i="0" u="none" strike="noStrike" cap="none" normalizeH="0" baseline="0">
-                        <a:solidFill>
-                          <a:schemeClr val="tx1"/>
-                        </a:solidFill>
-                        <a:effectLst/>
-                        <a:latin typeface="맑은 고딕"/>
-                        <a:ea typeface="맑은 고딕"/>
-                        <a:cs typeface="+mn-cs"/>
-                      </a:endParaRPr>
                     </a:p>
                   </a:txBody>
                   <a:tcPr marL="89475" marR="89475" marT="44736" marB="44736" horzOverflow="overflow">
@@ -10473,7 +10360,7 @@
                 </a:tc>
                 <a:tc>
                   <a:txBody>
-                    <a:bodyPr vert="horz" lIns="89475" tIns="44735" rIns="89475" bIns="44735" anchor="t" anchorCtr="0"/>
+                    <a:bodyPr/>
                     <a:lstStyle>
                       <a:lvl1pPr>
                         <a:defRPr kumimoji="1" sz="1200">
@@ -10630,15 +10517,6 @@
                         </a:rPr>
                         <a:t>23</a:t>
                       </a:r>
-                      <a:endParaRPr kumimoji="0" lang="en-US" altLang="ko-KR" sz="900" b="0" i="0" u="none" strike="noStrike" cap="none" normalizeH="0" baseline="0">
-                        <a:solidFill>
-                          <a:schemeClr val="tx1"/>
-                        </a:solidFill>
-                        <a:effectLst/>
-                        <a:latin typeface="맑은 고딕"/>
-                        <a:ea typeface="맑은 고딕"/>
-                        <a:cs typeface="+mn-cs"/>
-                      </a:endParaRPr>
                     </a:p>
                   </a:txBody>
                   <a:tcPr marL="89475" marR="89475" marT="44736" marB="44736" horzOverflow="overflow">
@@ -10681,7 +10559,7 @@
                 </a:tc>
                 <a:tc>
                   <a:txBody>
-                    <a:bodyPr vert="horz" lIns="89475" tIns="44735" rIns="89475" bIns="44735" anchor="t" anchorCtr="0"/>
+                    <a:bodyPr/>
                     <a:lstStyle>
                       <a:lvl1pPr>
                         <a:defRPr kumimoji="1" sz="1200">
@@ -10838,15 +10716,6 @@
                         </a:rPr>
                         <a:t>24</a:t>
                       </a:r>
-                      <a:endParaRPr kumimoji="0" lang="en-US" altLang="ko-KR" sz="900" b="0" i="0" u="none" strike="noStrike" cap="none" normalizeH="0" baseline="0">
-                        <a:solidFill>
-                          <a:schemeClr val="tx1"/>
-                        </a:solidFill>
-                        <a:effectLst/>
-                        <a:latin typeface="맑은 고딕"/>
-                        <a:ea typeface="맑은 고딕"/>
-                        <a:cs typeface="+mn-cs"/>
-                      </a:endParaRPr>
                     </a:p>
                   </a:txBody>
                   <a:tcPr marL="89475" marR="89475" marT="44736" marB="44736" horzOverflow="overflow">
@@ -10889,7 +10758,7 @@
                 </a:tc>
                 <a:tc>
                   <a:txBody>
-                    <a:bodyPr vert="horz" lIns="89475" tIns="44735" rIns="89475" bIns="44735" anchor="t" anchorCtr="0"/>
+                    <a:bodyPr/>
                     <a:lstStyle>
                       <a:lvl1pPr>
                         <a:defRPr kumimoji="1" sz="1200">
@@ -11037,7 +10906,7 @@
                       <a:r>
                         <a:rPr kumimoji="0" lang="en-US" altLang="ko-KR" sz="900" b="0" i="0" u="none" strike="noStrike" cap="none" normalizeH="0" baseline="0">
                           <a:solidFill>
-                            <a:srgbClr val="0000cc"/>
+                            <a:srgbClr val="0000CC"/>
                           </a:solidFill>
                           <a:effectLst/>
                           <a:latin typeface="맑은 고딕"/>
@@ -11046,15 +10915,6 @@
                         </a:rPr>
                         <a:t>25</a:t>
                       </a:r>
-                      <a:endParaRPr kumimoji="0" lang="en-US" altLang="ko-KR" sz="900" b="0" i="0" u="none" strike="noStrike" cap="none" normalizeH="0" baseline="0">
-                        <a:solidFill>
-                          <a:srgbClr val="0000cc"/>
-                        </a:solidFill>
-                        <a:effectLst/>
-                        <a:latin typeface="맑은 고딕"/>
-                        <a:ea typeface="맑은 고딕"/>
-                        <a:cs typeface="+mn-cs"/>
-                      </a:endParaRPr>
                     </a:p>
                   </a:txBody>
                   <a:tcPr marL="89475" marR="89475" marT="44736" marB="44736" horzOverflow="overflow">
@@ -11095,11 +10955,16 @@
                     <a:noFill/>
                   </a:tcPr>
                 </a:tc>
+                <a:extLst>
+                  <a:ext uri="{0D108BD9-81ED-4DB2-BD59-A6C34878D82A}">
+                    <a16:rowId xmlns:a16="http://schemas.microsoft.com/office/drawing/2014/main" val="10004"/>
+                  </a:ext>
+                </a:extLst>
               </a:tr>
               <a:tr h="837329">
                 <a:tc>
                   <a:txBody>
-                    <a:bodyPr vert="horz" lIns="89475" tIns="44720" rIns="89475" bIns="44720" anchor="t" anchorCtr="0"/>
+                    <a:bodyPr/>
                     <a:lstStyle>
                       <a:lvl1pPr>
                         <a:defRPr kumimoji="1" sz="1200">
@@ -11247,7 +11112,7 @@
                       <a:r>
                         <a:rPr kumimoji="0" lang="en-US" altLang="ko-KR" sz="900" b="0" i="0" u="none" strike="noStrike" cap="none" normalizeH="0" baseline="0">
                           <a:solidFill>
-                            <a:srgbClr val="ff0000"/>
+                            <a:srgbClr val="FF0000"/>
                           </a:solidFill>
                           <a:effectLst/>
                           <a:latin typeface="맑은 고딕"/>
@@ -11256,15 +11121,6 @@
                         </a:rPr>
                         <a:t>26</a:t>
                       </a:r>
-                      <a:endParaRPr kumimoji="0" lang="en-US" altLang="ko-KR" sz="900" b="0" i="0" u="none" strike="noStrike" cap="none" normalizeH="0" baseline="0">
-                        <a:solidFill>
-                          <a:srgbClr val="ff0000"/>
-                        </a:solidFill>
-                        <a:effectLst/>
-                        <a:latin typeface="맑은 고딕"/>
-                        <a:ea typeface="맑은 고딕"/>
-                        <a:cs typeface="+mn-cs"/>
-                      </a:endParaRPr>
                     </a:p>
                   </a:txBody>
                   <a:tcPr marL="89475" marR="89475" marT="44720" marB="44720" horzOverflow="overflow">
@@ -11307,7 +11163,7 @@
                 </a:tc>
                 <a:tc>
                   <a:txBody>
-                    <a:bodyPr vert="horz" lIns="89475" tIns="44720" rIns="89475" bIns="44720" anchor="t" anchorCtr="0"/>
+                    <a:bodyPr/>
                     <a:lstStyle>
                       <a:lvl1pPr defTabSz="957263">
                         <a:defRPr kumimoji="1" sz="1200">
@@ -11464,15 +11320,6 @@
                         </a:rPr>
                         <a:t>27</a:t>
                       </a:r>
-                      <a:endParaRPr kumimoji="0" lang="en-US" altLang="ko-KR" sz="900" b="0" i="0" u="none" strike="noStrike" cap="none" normalizeH="0" baseline="0">
-                        <a:solidFill>
-                          <a:schemeClr val="tx1"/>
-                        </a:solidFill>
-                        <a:effectLst/>
-                        <a:latin typeface="맑은 고딕"/>
-                        <a:ea typeface="맑은 고딕"/>
-                        <a:cs typeface="+mn-cs"/>
-                      </a:endParaRPr>
                     </a:p>
                   </a:txBody>
                   <a:tcPr marL="89475" marR="89475" marT="44720" marB="44720" horzOverflow="overflow">
@@ -11515,7 +11362,7 @@
                 </a:tc>
                 <a:tc>
                   <a:txBody>
-                    <a:bodyPr vert="horz" lIns="89475" tIns="44720" rIns="89475" bIns="44720" anchor="t" anchorCtr="0"/>
+                    <a:bodyPr/>
                     <a:lstStyle>
                       <a:lvl1pPr defTabSz="957263">
                         <a:defRPr kumimoji="1" sz="1200">
@@ -11672,15 +11519,6 @@
                         </a:rPr>
                         <a:t>28</a:t>
                       </a:r>
-                      <a:endParaRPr kumimoji="0" lang="en-US" altLang="ko-KR" sz="900" b="0" i="0" u="none" strike="noStrike" cap="none" normalizeH="0" baseline="0">
-                        <a:solidFill>
-                          <a:schemeClr val="tx1"/>
-                        </a:solidFill>
-                        <a:effectLst/>
-                        <a:latin typeface="맑은 고딕"/>
-                        <a:ea typeface="맑은 고딕"/>
-                        <a:cs typeface="+mn-cs"/>
-                      </a:endParaRPr>
                     </a:p>
                   </a:txBody>
                   <a:tcPr marL="89475" marR="89475" marT="44720" marB="44720" horzOverflow="overflow">
@@ -11723,7 +11561,7 @@
                 </a:tc>
                 <a:tc>
                   <a:txBody>
-                    <a:bodyPr vert="horz" lIns="89475" tIns="44735" rIns="89475" bIns="44735" anchor="t" anchorCtr="0"/>
+                    <a:bodyPr/>
                     <a:lstStyle>
                       <a:lvl1pPr defTabSz="957263">
                         <a:defRPr kumimoji="1" sz="1200">
@@ -11880,15 +11718,6 @@
                         </a:rPr>
                         <a:t>29</a:t>
                       </a:r>
-                      <a:endParaRPr kumimoji="0" lang="en-US" altLang="ko-KR" sz="900" b="0" i="0" u="none" strike="noStrike" cap="none" normalizeH="0" baseline="0">
-                        <a:solidFill>
-                          <a:schemeClr val="tx1"/>
-                        </a:solidFill>
-                        <a:effectLst/>
-                        <a:latin typeface="맑은 고딕"/>
-                        <a:ea typeface="맑은 고딕"/>
-                        <a:cs typeface="+mn-cs"/>
-                      </a:endParaRPr>
                     </a:p>
                   </a:txBody>
                   <a:tcPr marL="89475" marR="89475" marT="44736" marB="44736" horzOverflow="overflow">
@@ -11931,7 +11760,7 @@
                 </a:tc>
                 <a:tc>
                   <a:txBody>
-                    <a:bodyPr vert="horz" lIns="89475" tIns="44735" rIns="89475" bIns="44735" anchor="t" anchorCtr="0"/>
+                    <a:bodyPr/>
                     <a:lstStyle>
                       <a:lvl1pPr>
                         <a:defRPr kumimoji="1" sz="1200">
@@ -12088,15 +11917,6 @@
                         </a:rPr>
                         <a:t>30</a:t>
                       </a:r>
-                      <a:endParaRPr kumimoji="0" lang="en-US" altLang="ko-KR" sz="900" b="0" i="0" u="none" strike="noStrike" cap="none" normalizeH="0" baseline="0">
-                        <a:solidFill>
-                          <a:schemeClr val="tx1"/>
-                        </a:solidFill>
-                        <a:effectLst/>
-                        <a:latin typeface="맑은 고딕"/>
-                        <a:ea typeface="맑은 고딕"/>
-                        <a:cs typeface="+mn-cs"/>
-                      </a:endParaRPr>
                     </a:p>
                   </a:txBody>
                   <a:tcPr marL="89475" marR="89475" marT="44736" marB="44736" horzOverflow="overflow">
@@ -12139,7 +11959,7 @@
                 </a:tc>
                 <a:tc>
                   <a:txBody>
-                    <a:bodyPr vert="horz" lIns="89475" tIns="44735" rIns="89475" bIns="44735" anchor="t" anchorCtr="0"/>
+                    <a:bodyPr/>
                     <a:lstStyle>
                       <a:lvl1pPr>
                         <a:defRPr kumimoji="1" sz="1200">
@@ -12296,15 +12116,6 @@
                         </a:rPr>
                         <a:t>31</a:t>
                       </a:r>
-                      <a:endParaRPr kumimoji="0" lang="en-US" altLang="ko-KR" sz="900" b="0" i="0" u="none" strike="noStrike" cap="none" normalizeH="0" baseline="0">
-                        <a:solidFill>
-                          <a:schemeClr val="tx1"/>
-                        </a:solidFill>
-                        <a:effectLst/>
-                        <a:latin typeface="맑은 고딕"/>
-                        <a:ea typeface="맑은 고딕"/>
-                        <a:cs typeface="+mn-cs"/>
-                      </a:endParaRPr>
                     </a:p>
                   </a:txBody>
                   <a:tcPr marL="89475" marR="89475" marT="44736" marB="44736" horzOverflow="overflow">
@@ -12347,7 +12158,7 @@
                 </a:tc>
                 <a:tc>
                   <a:txBody>
-                    <a:bodyPr vert="horz" lIns="89475" tIns="44735" rIns="89475" bIns="44735" anchor="t" anchorCtr="0"/>
+                    <a:bodyPr/>
                     <a:lstStyle>
                       <a:lvl1pPr>
                         <a:defRPr kumimoji="1" sz="1200">
@@ -12494,7 +12305,7 @@
                       </a:pPr>
                       <a:endParaRPr kumimoji="0" lang="en-US" altLang="ko-KR" sz="900" b="0" i="0" u="none" strike="noStrike" cap="none" normalizeH="0" baseline="0">
                         <a:solidFill>
-                          <a:srgbClr val="0000cc"/>
+                          <a:srgbClr val="0000CC"/>
                         </a:solidFill>
                         <a:effectLst/>
                         <a:latin typeface="맑은 고딕"/>
@@ -12541,6 +12352,11 @@
                     <a:noFill/>
                   </a:tcPr>
                 </a:tc>
+                <a:extLst>
+                  <a:ext uri="{0D108BD9-81ED-4DB2-BD59-A6C34878D82A}">
+                    <a16:rowId xmlns:a16="http://schemas.microsoft.com/office/drawing/2014/main" val="10005"/>
+                  </a:ext>
+                </a:extLst>
               </a:tr>
             </a:tbl>
           </a:graphicData>
@@ -12551,11 +12367,11 @@
   <p:clrMapOvr>
     <a:masterClrMapping/>
   </p:clrMapOvr>
-  <mc:AlternateContent xmlns:mc="http://schemas.openxmlformats.org/markup-compatibility/2006">
-    <mc:Choice xmlns:p14="http://schemas.microsoft.com/office/powerpoint/2010/main" Requires="p14">
-      <p:transition xmlns:mc="http://schemas.openxmlformats.org/markup-compatibility/2006" xmlns:p14="http://schemas.microsoft.com/office/powerpoint/2010/main" mc:Ignorable="p14" p14:dur="500"/>
+  <mc:AlternateContent xmlns:mc="http://schemas.openxmlformats.org/markup-compatibility/2006" xmlns:p14="http://schemas.microsoft.com/office/powerpoint/2010/main">
+    <mc:Choice Requires="p14">
+      <p:transition/>
     </mc:Choice>
-    <mc:Fallback>
+    <mc:Fallback xmlns:dsp="http://schemas.microsoft.com/office/drawing/2008/diagram" xmlns:dgm="http://schemas.openxmlformats.org/drawingml/2006/diagram" xmlns:c="http://schemas.openxmlformats.org/drawingml/2006/chart" xmlns="">
       <p:transition/>
     </mc:Fallback>
   </mc:AlternateContent>
@@ -12570,14 +12386,14 @@
 </file>
 
 <file path=ppt/theme/theme1.xml><?xml version="1.0" encoding="utf-8"?>
-<a:theme xmlns:r="http://schemas.openxmlformats.org/officeDocument/2006/relationships" xmlns:c="http://schemas.openxmlformats.org/drawingml/2006/chart" xmlns:dgm="http://schemas.openxmlformats.org/drawingml/2006/diagram" xmlns:dsp="http://schemas.microsoft.com/office/drawing/2008/diagram" xmlns:a="http://schemas.openxmlformats.org/drawingml/2006/main" xmlns:pic="http://schemas.openxmlformats.org/drawingml/2006/picture" xmlns:wp="http://schemas.openxmlformats.org/drawingml/2006/wordprocessingDrawing" xmlns:xdr="http://schemas.openxmlformats.org/drawingml/2006/spreadsheetDrawing" xmlns:p="http://schemas.openxmlformats.org/presentationml/2006/main" name="S-Oil SO Proposal_인프라_0814_V1.1">
+<a:theme xmlns:a="http://schemas.openxmlformats.org/drawingml/2006/main" name="S-Oil SO Proposal_인프라_0814_V1.1">
   <a:themeElements>
     <a:clrScheme name="S-Oil SO Proposal_인프라_0814_V1.1 1">
       <a:dk1>
         <a:srgbClr val="000000"/>
       </a:dk1>
       <a:lt1>
-        <a:srgbClr val="ffffff"/>
+        <a:srgbClr val="FFFFFF"/>
       </a:lt1>
       <a:dk2>
         <a:srgbClr val="000000"/>
@@ -12586,28 +12402,28 @@
         <a:srgbClr val="808080"/>
       </a:lt2>
       <a:accent1>
-        <a:srgbClr val="bbe0e3"/>
+        <a:srgbClr val="BBE0E3"/>
       </a:accent1>
       <a:accent2>
         <a:srgbClr val="333399"/>
       </a:accent2>
       <a:accent3>
-        <a:srgbClr val="ffffff"/>
+        <a:srgbClr val="FFFFFF"/>
       </a:accent3>
       <a:accent4>
         <a:srgbClr val="000000"/>
       </a:accent4>
       <a:accent5>
-        <a:srgbClr val="daedef"/>
+        <a:srgbClr val="DAEDEF"/>
       </a:accent5>
       <a:accent6>
-        <a:srgbClr val="2d2d8a"/>
+        <a:srgbClr val="2D2D8A"/>
       </a:accent6>
       <a:hlink>
         <a:srgbClr val="009999"/>
       </a:hlink>
       <a:folHlink>
-        <a:srgbClr val="99cc00"/>
+        <a:srgbClr val="99CC00"/>
       </a:folHlink>
     </a:clrScheme>
     <a:fontScheme name="S-Oil SO Proposal_인프라_0814_V1.1">
@@ -12894,18 +12710,19 @@
       <a:lstStyle/>
     </a:txDef>
   </a:objectDefaults>
+  <a:extraClrSchemeLst/>
 </a:theme>
 </file>
 
 <file path=ppt/theme/theme2.xml><?xml version="1.0" encoding="utf-8"?>
-<a:theme xmlns:r="http://schemas.openxmlformats.org/officeDocument/2006/relationships" xmlns:c="http://schemas.openxmlformats.org/drawingml/2006/chart" xmlns:dgm="http://schemas.openxmlformats.org/drawingml/2006/diagram" xmlns:dsp="http://schemas.microsoft.com/office/drawing/2008/diagram" xmlns:a="http://schemas.openxmlformats.org/drawingml/2006/main" xmlns:pic="http://schemas.openxmlformats.org/drawingml/2006/picture" xmlns:wp="http://schemas.openxmlformats.org/drawingml/2006/wordprocessingDrawing" xmlns:xdr="http://schemas.openxmlformats.org/drawingml/2006/spreadsheetDrawing" xmlns:p="http://schemas.openxmlformats.org/presentationml/2006/main" name="Office 테마">
+<a:theme xmlns:a="http://schemas.openxmlformats.org/drawingml/2006/main" name="Office 테마">
   <a:themeElements>
     <a:clrScheme name="">
       <a:dk1>
         <a:srgbClr val="000000"/>
       </a:dk1>
       <a:lt1>
-        <a:srgbClr val="ffffff"/>
+        <a:srgbClr val="FFFFFF"/>
       </a:lt1>
       <a:dk2>
         <a:srgbClr val="000000"/>
@@ -12914,28 +12731,28 @@
         <a:srgbClr val="808080"/>
       </a:lt2>
       <a:accent1>
-        <a:srgbClr val="bbe0e3"/>
+        <a:srgbClr val="BBE0E3"/>
       </a:accent1>
       <a:accent2>
         <a:srgbClr val="333399"/>
       </a:accent2>
       <a:accent3>
-        <a:srgbClr val="ffffff"/>
+        <a:srgbClr val="FFFFFF"/>
       </a:accent3>
       <a:accent4>
         <a:srgbClr val="000000"/>
       </a:accent4>
       <a:accent5>
-        <a:srgbClr val="daedef"/>
+        <a:srgbClr val="DAEDEF"/>
       </a:accent5>
       <a:accent6>
-        <a:srgbClr val="2d2d8a"/>
+        <a:srgbClr val="2D2D8A"/>
       </a:accent6>
       <a:hlink>
         <a:srgbClr val="009999"/>
       </a:hlink>
       <a:folHlink>
-        <a:srgbClr val="99cc00"/>
+        <a:srgbClr val="99CC00"/>
       </a:folHlink>
     </a:clrScheme>
     <a:fontScheme name="Office">
@@ -13175,18 +12992,20 @@
       </a:bgFillStyleLst>
     </a:fmtScheme>
   </a:themeElements>
+  <a:objectDefaults/>
+  <a:extraClrSchemeLst/>
 </a:theme>
 </file>
 
 <file path=ppt/theme/theme3.xml><?xml version="1.0" encoding="utf-8"?>
-<a:theme xmlns:r="http://schemas.openxmlformats.org/officeDocument/2006/relationships" xmlns:c="http://schemas.openxmlformats.org/drawingml/2006/chart" xmlns:dgm="http://schemas.openxmlformats.org/drawingml/2006/diagram" xmlns:dsp="http://schemas.microsoft.com/office/drawing/2008/diagram" xmlns:a="http://schemas.openxmlformats.org/drawingml/2006/main" xmlns:pic="http://schemas.openxmlformats.org/drawingml/2006/picture" xmlns:wp="http://schemas.openxmlformats.org/drawingml/2006/wordprocessingDrawing" xmlns:xdr="http://schemas.openxmlformats.org/drawingml/2006/spreadsheetDrawing" xmlns:p="http://schemas.openxmlformats.org/presentationml/2006/main" name="Office 테마">
+<a:theme xmlns:a="http://schemas.openxmlformats.org/drawingml/2006/main" name="Office 테마">
   <a:themeElements>
     <a:clrScheme name="">
       <a:dk1>
         <a:srgbClr val="000000"/>
       </a:dk1>
       <a:lt1>
-        <a:srgbClr val="ffffff"/>
+        <a:srgbClr val="FFFFFF"/>
       </a:lt1>
       <a:dk2>
         <a:srgbClr val="000000"/>
@@ -13195,28 +13014,28 @@
         <a:srgbClr val="808080"/>
       </a:lt2>
       <a:accent1>
-        <a:srgbClr val="bbe0e3"/>
+        <a:srgbClr val="BBE0E3"/>
       </a:accent1>
       <a:accent2>
         <a:srgbClr val="333399"/>
       </a:accent2>
       <a:accent3>
-        <a:srgbClr val="ffffff"/>
+        <a:srgbClr val="FFFFFF"/>
       </a:accent3>
       <a:accent4>
         <a:srgbClr val="000000"/>
       </a:accent4>
       <a:accent5>
-        <a:srgbClr val="daedef"/>
+        <a:srgbClr val="DAEDEF"/>
       </a:accent5>
       <a:accent6>
-        <a:srgbClr val="2d2d8a"/>
+        <a:srgbClr val="2D2D8A"/>
       </a:accent6>
       <a:hlink>
         <a:srgbClr val="009999"/>
       </a:hlink>
       <a:folHlink>
-        <a:srgbClr val="99cc00"/>
+        <a:srgbClr val="99CC00"/>
       </a:folHlink>
     </a:clrScheme>
     <a:fontScheme name="Office">
@@ -13456,5 +13275,7 @@
       </a:bgFillStyleLst>
     </a:fmtScheme>
   </a:themeElements>
+  <a:objectDefaults/>
+  <a:extraClrSchemeLst/>
 </a:theme>
 </file>
</xml_diff>